<commit_message>
Add the Automation Testing Final
</commit_message>
<xml_diff>
--- a/kpi/Automation Testing/Automation Testing_20200722.pptx
+++ b/kpi/Automation Testing/Automation Testing_20200722.pptx
@@ -24,7 +24,7 @@
     <p:sldId id="599" r:id="rId12"/>
     <p:sldId id="600" r:id="rId13"/>
     <p:sldId id="601" r:id="rId14"/>
-    <p:sldId id="602" r:id="rId15"/>
+    <p:sldId id="624" r:id="rId15"/>
     <p:sldId id="603" r:id="rId16"/>
     <p:sldId id="604" r:id="rId17"/>
     <p:sldId id="605" r:id="rId18"/>
@@ -4705,50 +4705,6 @@
           <a:bodyPr/>
           <a:lstStyle/>
           <a:p>
-            <a:pPr marL="0" marR="0" indent="0" algn="l" defTabSz="914400" rtl="0" eaLnBrk="0" fontAlgn="base" latinLnBrk="0" hangingPunct="0">
-              <a:lnSpc>
-                <a:spcPct val="100000"/>
-              </a:lnSpc>
-              <a:spcBef>
-                <a:spcPct val="30000"/>
-              </a:spcBef>
-              <a:spcAft>
-                <a:spcPct val="0"/>
-              </a:spcAft>
-              <a:buClrTx/>
-              <a:buSzTx/>
-              <a:buFontTx/>
-              <a:buNone/>
-              <a:tabLst/>
-              <a:defRPr/>
-            </a:pPr>
-            <a:r>
-              <a:rPr lang="zh-TW" altLang="en-US" dirty="0" smtClean="0"/>
-              <a:t>在做 </a:t>
-            </a:r>
-            <a:r>
-              <a:rPr lang="en-US" altLang="zh-TW" dirty="0" smtClean="0"/>
-              <a:t>Airplane</a:t>
-            </a:r>
-            <a:r>
-              <a:rPr lang="en-US" altLang="zh-TW" baseline="0" dirty="0" smtClean="0"/>
-              <a:t> mode </a:t>
-            </a:r>
-            <a:r>
-              <a:rPr lang="zh-TW" altLang="en-US" baseline="0" dirty="0" smtClean="0"/>
-              <a:t>切換的情況下可以透過這隻程式去確認，會不會有 </a:t>
-            </a:r>
-            <a:r>
-              <a:rPr lang="en-US" altLang="zh-TW" baseline="0" dirty="0" smtClean="0"/>
-              <a:t>Exception </a:t>
-            </a:r>
-            <a:r>
-              <a:rPr lang="zh-TW" altLang="en-US" baseline="0" dirty="0" smtClean="0"/>
-              <a:t>的狀況，比如畫面上的異常、長時間切換的途中切換問題、以及切換過後網路連線失敗的問題</a:t>
-            </a:r>
-            <a:endParaRPr lang="en-US" altLang="zh-TW" dirty="0" smtClean="0"/>
-          </a:p>
-          <a:p>
             <a:endParaRPr lang="en-US" altLang="zh-TW" dirty="0" smtClean="0"/>
           </a:p>
         </p:txBody>
@@ -4865,7 +4821,7 @@
     </p:spTree>
     <p:extLst>
       <p:ext uri="{BB962C8B-B14F-4D97-AF65-F5344CB8AC3E}">
-        <p14:creationId xmlns:p14="http://schemas.microsoft.com/office/powerpoint/2010/main" val="1957161656"/>
+        <p14:creationId xmlns:p14="http://schemas.microsoft.com/office/powerpoint/2010/main" val="2694808797"/>
       </p:ext>
     </p:extLst>
   </p:cSld>
@@ -5344,28 +5300,6 @@
           <a:bodyPr/>
           <a:lstStyle/>
           <a:p>
-            <a:r>
-              <a:rPr lang="zh-TW" altLang="en-US" dirty="0" smtClean="0"/>
-              <a:t>由於部門內部原先的同仁在測試量測 </a:t>
-            </a:r>
-            <a:r>
-              <a:rPr lang="en-US" altLang="zh-TW" dirty="0" smtClean="0"/>
-              <a:t>Panel </a:t>
-            </a:r>
-            <a:r>
-              <a:rPr lang="zh-TW" altLang="en-US" dirty="0" smtClean="0"/>
-              <a:t>時都是採納約略的位置，因為沒有治具，所以我開發了這支程式來更精準解決改善測試精準度這件事，所以未來只要是有產品的規格，依照規格輸入所需的相關資訊便可以自動產生精確量測 </a:t>
-            </a:r>
-            <a:r>
-              <a:rPr lang="en-US" altLang="zh-TW" dirty="0" smtClean="0"/>
-              <a:t>Panel </a:t>
-            </a:r>
-            <a:r>
-              <a:rPr lang="zh-TW" altLang="en-US" dirty="0" smtClean="0"/>
-              <a:t>的位置，而這支程式其實取代的是人工繪圖這一段，並不是所謂的自動量測的部分</a:t>
-            </a:r>
-          </a:p>
-          <a:p>
             <a:endParaRPr lang="en-US" altLang="zh-TW" dirty="0" smtClean="0"/>
           </a:p>
         </p:txBody>
@@ -6046,28 +5980,6 @@
           <a:bodyPr/>
           <a:lstStyle/>
           <a:p>
-            <a:r>
-              <a:rPr lang="zh-TW" altLang="en-US" dirty="0" smtClean="0"/>
-              <a:t>目前是用 </a:t>
-            </a:r>
-            <a:r>
-              <a:rPr lang="en-US" altLang="zh-TW" dirty="0" smtClean="0"/>
-              <a:t>pen driver </a:t>
-            </a:r>
-            <a:r>
-              <a:rPr lang="zh-TW" altLang="en-US" dirty="0" smtClean="0"/>
-              <a:t>複製出來並且到代測物做安裝的動作，由於提升部門內部下載程式的便利性，如果可以有一隻程式可以直接透過它連到 </a:t>
-            </a:r>
-            <a:r>
-              <a:rPr lang="en-US" altLang="zh-TW" dirty="0" smtClean="0"/>
-              <a:t>DQA Server </a:t>
-            </a:r>
-            <a:r>
-              <a:rPr lang="zh-TW" altLang="en-US" dirty="0" smtClean="0"/>
-              <a:t>即可以直接下載到代測物上面會較快速許多，才開發此程式</a:t>
-            </a:r>
-          </a:p>
-          <a:p>
             <a:endParaRPr lang="en-US" altLang="zh-TW" dirty="0" smtClean="0"/>
           </a:p>
         </p:txBody>
@@ -6839,192 +6751,6 @@
         <p:txBody>
           <a:bodyPr/>
           <a:lstStyle/>
-          <a:p>
-            <a:pPr marL="0" marR="0" indent="0" algn="l" defTabSz="914400" rtl="0" eaLnBrk="0" fontAlgn="base" latinLnBrk="0" hangingPunct="0">
-              <a:lnSpc>
-                <a:spcPct val="100000"/>
-              </a:lnSpc>
-              <a:spcBef>
-                <a:spcPct val="30000"/>
-              </a:spcBef>
-              <a:spcAft>
-                <a:spcPct val="0"/>
-              </a:spcAft>
-              <a:buClrTx/>
-              <a:buSzTx/>
-              <a:buFontTx/>
-              <a:buNone/>
-              <a:tabLst/>
-              <a:defRPr/>
-            </a:pPr>
-            <a:r>
-              <a:rPr lang="zh-TW" altLang="en-US" dirty="0" smtClean="0"/>
-              <a:t>因為過去在測試 </a:t>
-            </a:r>
-            <a:r>
-              <a:rPr lang="en-US" altLang="zh-TW" dirty="0" smtClean="0"/>
-              <a:t>Roaming </a:t>
-            </a:r>
-            <a:r>
-              <a:rPr lang="zh-TW" altLang="en-US" dirty="0" smtClean="0"/>
-              <a:t>程式時，是要用人力去推著 </a:t>
-            </a:r>
-            <a:r>
-              <a:rPr lang="en-US" altLang="zh-TW" dirty="0" smtClean="0"/>
-              <a:t>AP</a:t>
-            </a:r>
-            <a:r>
-              <a:rPr lang="zh-TW" altLang="en-US" dirty="0" smtClean="0"/>
-              <a:t> ，並且人力去斷電，但現在可以透過程式去 </a:t>
-            </a:r>
-            <a:r>
-              <a:rPr lang="en-US" altLang="zh-TW" dirty="0" smtClean="0"/>
-              <a:t>Control</a:t>
-            </a:r>
-            <a:r>
-              <a:rPr lang="zh-TW" altLang="en-US" baseline="0" dirty="0" smtClean="0"/>
-              <a:t> 然後可以讓系統去自動 </a:t>
-            </a:r>
-            <a:r>
-              <a:rPr lang="en-US" altLang="zh-TW" baseline="0" dirty="0" smtClean="0"/>
-              <a:t>Reboot</a:t>
-            </a:r>
-          </a:p>
-          <a:p>
-            <a:pPr marL="0" marR="0" indent="0" algn="l" defTabSz="914400" rtl="0" eaLnBrk="0" fontAlgn="base" latinLnBrk="0" hangingPunct="0">
-              <a:lnSpc>
-                <a:spcPct val="100000"/>
-              </a:lnSpc>
-              <a:spcBef>
-                <a:spcPct val="30000"/>
-              </a:spcBef>
-              <a:spcAft>
-                <a:spcPct val="0"/>
-              </a:spcAft>
-              <a:buClrTx/>
-              <a:buSzTx/>
-              <a:buFontTx/>
-              <a:buNone/>
-              <a:tabLst/>
-              <a:defRPr/>
-            </a:pPr>
-            <a:r>
-              <a:rPr lang="zh-TW" altLang="en-US" baseline="0" dirty="0" smtClean="0"/>
-              <a:t>也就是說我的 </a:t>
-            </a:r>
-            <a:r>
-              <a:rPr lang="en-US" altLang="zh-TW" baseline="0" dirty="0" smtClean="0"/>
-              <a:t>DUT </a:t>
-            </a:r>
-            <a:r>
-              <a:rPr lang="zh-TW" altLang="en-US" baseline="0" dirty="0" smtClean="0"/>
-              <a:t>只要裝上這隻程式，就可以從 </a:t>
-            </a:r>
-            <a:r>
-              <a:rPr lang="en-US" altLang="zh-TW" baseline="0" dirty="0" smtClean="0"/>
-              <a:t>AP A Switch </a:t>
-            </a:r>
-            <a:r>
-              <a:rPr lang="zh-TW" altLang="en-US" baseline="0" dirty="0" smtClean="0"/>
-              <a:t>到 </a:t>
-            </a:r>
-            <a:r>
-              <a:rPr lang="en-US" altLang="zh-TW" baseline="0" dirty="0" smtClean="0"/>
-              <a:t>AP B</a:t>
-            </a:r>
-            <a:r>
-              <a:rPr lang="zh-TW" altLang="en-US" baseline="0" dirty="0" smtClean="0"/>
-              <a:t> 然後再切換回來</a:t>
-            </a:r>
-            <a:endParaRPr lang="en-US" altLang="zh-TW" baseline="0" dirty="0" smtClean="0"/>
-          </a:p>
-          <a:p>
-            <a:pPr marL="0" marR="0" indent="0" algn="l" defTabSz="914400" rtl="0" eaLnBrk="0" fontAlgn="base" latinLnBrk="0" hangingPunct="0">
-              <a:lnSpc>
-                <a:spcPct val="100000"/>
-              </a:lnSpc>
-              <a:spcBef>
-                <a:spcPct val="30000"/>
-              </a:spcBef>
-              <a:spcAft>
-                <a:spcPct val="0"/>
-              </a:spcAft>
-              <a:buClrTx/>
-              <a:buSzTx/>
-              <a:buFontTx/>
-              <a:buNone/>
-              <a:tabLst/>
-              <a:defRPr/>
-            </a:pPr>
-            <a:r>
-              <a:rPr lang="zh-TW" altLang="en-US" dirty="0" smtClean="0"/>
-              <a:t>我的代測物很簡單，他只要連到其中一台 </a:t>
-            </a:r>
-            <a:r>
-              <a:rPr lang="en-US" altLang="zh-TW" dirty="0" smtClean="0"/>
-              <a:t>AP </a:t>
-            </a:r>
-            <a:r>
-              <a:rPr lang="zh-TW" altLang="en-US" dirty="0" smtClean="0"/>
-              <a:t>之後，就可以 </a:t>
-            </a:r>
-            <a:r>
-              <a:rPr lang="en-US" altLang="zh-TW" dirty="0" smtClean="0"/>
-              <a:t>A switch </a:t>
-            </a:r>
-            <a:r>
-              <a:rPr lang="zh-TW" altLang="en-US" dirty="0" smtClean="0"/>
-              <a:t>到 </a:t>
-            </a:r>
-            <a:r>
-              <a:rPr lang="en-US" altLang="zh-TW" dirty="0" smtClean="0"/>
-              <a:t>B </a:t>
-            </a:r>
-            <a:r>
-              <a:rPr lang="zh-TW" altLang="en-US" dirty="0" smtClean="0"/>
-              <a:t>又可以從 </a:t>
-            </a:r>
-            <a:r>
-              <a:rPr lang="en-US" altLang="zh-TW" dirty="0" smtClean="0"/>
-              <a:t>B switch </a:t>
-            </a:r>
-            <a:r>
-              <a:rPr lang="zh-TW" altLang="en-US" dirty="0" smtClean="0"/>
-              <a:t>到 </a:t>
-            </a:r>
-            <a:r>
-              <a:rPr lang="en-US" altLang="zh-TW" dirty="0" smtClean="0"/>
-              <a:t>A</a:t>
-            </a:r>
-            <a:r>
-              <a:rPr lang="zh-TW" altLang="en-US" dirty="0" smtClean="0"/>
-              <a:t>，那這個 </a:t>
-            </a:r>
-            <a:r>
-              <a:rPr lang="en-US" altLang="zh-TW" dirty="0" smtClean="0"/>
-              <a:t>AP </a:t>
-            </a:r>
-            <a:r>
-              <a:rPr lang="zh-TW" altLang="en-US" dirty="0" smtClean="0"/>
-              <a:t>可以換成其他台，但是程式要針對 </a:t>
-            </a:r>
-            <a:r>
-              <a:rPr lang="en-US" altLang="zh-TW" dirty="0" smtClean="0"/>
-              <a:t>Web UI </a:t>
-            </a:r>
-            <a:r>
-              <a:rPr lang="zh-TW" altLang="en-US" dirty="0" smtClean="0"/>
-              <a:t>的介面做修改，我就可以 </a:t>
-            </a:r>
-            <a:r>
-              <a:rPr lang="en-US" altLang="zh-TW" dirty="0" smtClean="0"/>
-              <a:t>Run </a:t>
-            </a:r>
-            <a:r>
-              <a:rPr lang="zh-TW" altLang="en-US" dirty="0" smtClean="0"/>
-              <a:t>了</a:t>
-            </a:r>
-          </a:p>
           <a:p>
             <a:pPr marL="0" marR="0" indent="0" algn="l" defTabSz="914400" rtl="0" eaLnBrk="0" fontAlgn="base" latinLnBrk="0" hangingPunct="0">
               <a:lnSpc>
@@ -11078,7 +10804,7 @@
         </p:blipFill>
         <p:spPr bwMode="auto">
           <a:xfrm>
-            <a:off x="5898836" y="1987007"/>
+            <a:off x="5900188" y="2104513"/>
             <a:ext cx="1072558" cy="1072558"/>
           </a:xfrm>
           <a:prstGeom prst="rect">
@@ -11226,22 +10952,22 @@
         <p:nvCxnSpPr>
           <p:cNvPr id="146" name="弧形接點 145"/>
           <p:cNvCxnSpPr>
-            <a:stCxn id="120" idx="0"/>
-            <a:endCxn id="118" idx="0"/>
+            <a:stCxn id="109" idx="3"/>
+            <a:endCxn id="105" idx="1"/>
           </p:cNvCxnSpPr>
           <p:nvPr/>
         </p:nvCxnSpPr>
         <p:spPr>
-          <a:xfrm rot="16200000" flipH="1">
-            <a:off x="4512292" y="-130924"/>
-            <a:ext cx="224" cy="3776119"/>
+          <a:xfrm flipV="1">
+            <a:off x="3076646" y="2640792"/>
+            <a:ext cx="2823542" cy="15105"/>
           </a:xfrm>
           <a:prstGeom prst="curvedConnector3">
             <a:avLst>
-              <a:gd name="adj1" fmla="val -102053571"/>
+              <a:gd name="adj1" fmla="val 50000"/>
             </a:avLst>
           </a:prstGeom>
-          <a:ln>
+          <a:ln w="19050">
             <a:tailEnd type="arrow"/>
           </a:ln>
         </p:spPr>
@@ -11268,7 +10994,7 @@
         </p:nvSpPr>
         <p:spPr>
           <a:xfrm>
-            <a:off x="3697421" y="1695151"/>
+            <a:off x="3652290" y="2669249"/>
             <a:ext cx="1672253" cy="369332"/>
           </a:xfrm>
           <a:prstGeom prst="rect">
@@ -11486,6 +11212,36 @@
           </a:p>
         </p:txBody>
       </p:sp>
+      <p:pic>
+        <p:nvPicPr>
+          <p:cNvPr id="17" name="圖片 16"/>
+          <p:cNvPicPr>
+            <a:picLocks noChangeAspect="1"/>
+          </p:cNvPicPr>
+          <p:nvPr/>
+        </p:nvPicPr>
+        <p:blipFill>
+          <a:blip r:embed="rId8" cstate="print">
+            <a:extLst>
+              <a:ext uri="{28A0092B-C50C-407E-A947-70E740481C1C}">
+                <a14:useLocalDpi xmlns:a14="http://schemas.microsoft.com/office/drawing/2010/main" val="0"/>
+              </a:ext>
+            </a:extLst>
+          </a:blip>
+          <a:stretch>
+            <a:fillRect/>
+          </a:stretch>
+        </p:blipFill>
+        <p:spPr>
+          <a:xfrm>
+            <a:off x="2244407" y="2377022"/>
+            <a:ext cx="759873" cy="401551"/>
+          </a:xfrm>
+          <a:prstGeom prst="rect">
+            <a:avLst/>
+          </a:prstGeom>
+        </p:spPr>
+      </p:pic>
     </p:spTree>
     <p:extLst>
       <p:ext uri="{BB962C8B-B14F-4D97-AF65-F5344CB8AC3E}">
@@ -12566,14 +12322,14 @@
       </p:grpSpPr>
       <p:pic>
         <p:nvPicPr>
-          <p:cNvPr id="1029" name="Picture 5" descr="C:\Users\ZL.chen\AppData\Local\Microsoft\Windows\INetCache\IE\UQUYCE7I\Android_4.4_with_stock_launcher[1].png"/>
+          <p:cNvPr id="59" name="Picture 3"/>
           <p:cNvPicPr>
             <a:picLocks noChangeAspect="1" noChangeArrowheads="1"/>
           </p:cNvPicPr>
           <p:nvPr/>
         </p:nvPicPr>
         <p:blipFill>
-          <a:blip r:embed="rId3" cstate="print">
+          <a:blip r:embed="rId3">
             <a:extLst>
               <a:ext uri="{28A0092B-C50C-407E-A947-70E740481C1C}">
                 <a14:useLocalDpi xmlns:a14="http://schemas.microsoft.com/office/drawing/2010/main" val="0"/>
@@ -12587,34 +12343,47 @@
         </p:blipFill>
         <p:spPr bwMode="auto">
           <a:xfrm>
-            <a:off x="4771147" y="1988123"/>
-            <a:ext cx="659571" cy="1098185"/>
+            <a:off x="1124744" y="1341318"/>
+            <a:ext cx="904601" cy="726422"/>
           </a:xfrm>
           <a:prstGeom prst="rect">
             <a:avLst/>
           </a:prstGeom>
           <a:noFill/>
+          <a:ln>
+            <a:noFill/>
+          </a:ln>
           <a:extLst>
             <a:ext uri="{909E8E84-426E-40DD-AFC4-6F175D3DCCD1}">
               <a14:hiddenFill xmlns:a14="http://schemas.microsoft.com/office/drawing/2010/main">
                 <a:solidFill>
-                  <a:srgbClr val="FFFFFF"/>
+                  <a:schemeClr val="accent1"/>
                 </a:solidFill>
               </a14:hiddenFill>
+            </a:ext>
+            <a:ext uri="{91240B29-F687-4F45-9708-019B960494DF}">
+              <a14:hiddenLine xmlns:a14="http://schemas.microsoft.com/office/drawing/2010/main" w="9525">
+                <a:solidFill>
+                  <a:schemeClr val="tx1"/>
+                </a:solidFill>
+                <a:miter lim="800000"/>
+                <a:headEnd/>
+                <a:tailEnd/>
+              </a14:hiddenLine>
             </a:ext>
           </a:extLst>
         </p:spPr>
       </p:pic>
       <p:pic>
         <p:nvPicPr>
-          <p:cNvPr id="55" name="Picture 5" descr="C:\Users\ZL.chen\AppData\Local\Microsoft\Windows\INetCache\IE\UQUYCE7I\Android_4.4_with_stock_launcher[1].png"/>
+          <p:cNvPr id="60" name="Picture 3"/>
           <p:cNvPicPr>
             <a:picLocks noChangeAspect="1" noChangeArrowheads="1"/>
           </p:cNvPicPr>
           <p:nvPr/>
         </p:nvPicPr>
         <p:blipFill>
-          <a:blip r:embed="rId3" cstate="print">
+          <a:blip r:embed="rId3">
             <a:extLst>
               <a:ext uri="{28A0092B-C50C-407E-A947-70E740481C1C}">
                 <a14:useLocalDpi xmlns:a14="http://schemas.microsoft.com/office/drawing/2010/main" val="0"/>
@@ -12628,34 +12397,47 @@
         </p:blipFill>
         <p:spPr bwMode="auto">
           <a:xfrm>
-            <a:off x="4771146" y="3421748"/>
-            <a:ext cx="659571" cy="1098185"/>
+            <a:off x="1124751" y="2431961"/>
+            <a:ext cx="904601" cy="726422"/>
           </a:xfrm>
           <a:prstGeom prst="rect">
             <a:avLst/>
           </a:prstGeom>
           <a:noFill/>
+          <a:ln>
+            <a:noFill/>
+          </a:ln>
           <a:extLst>
             <a:ext uri="{909E8E84-426E-40DD-AFC4-6F175D3DCCD1}">
               <a14:hiddenFill xmlns:a14="http://schemas.microsoft.com/office/drawing/2010/main">
                 <a:solidFill>
-                  <a:srgbClr val="FFFFFF"/>
+                  <a:schemeClr val="accent1"/>
                 </a:solidFill>
               </a14:hiddenFill>
+            </a:ext>
+            <a:ext uri="{91240B29-F687-4F45-9708-019B960494DF}">
+              <a14:hiddenLine xmlns:a14="http://schemas.microsoft.com/office/drawing/2010/main" w="9525">
+                <a:solidFill>
+                  <a:schemeClr val="tx1"/>
+                </a:solidFill>
+                <a:miter lim="800000"/>
+                <a:headEnd/>
+                <a:tailEnd/>
+              </a14:hiddenLine>
             </a:ext>
           </a:extLst>
         </p:spPr>
       </p:pic>
       <p:pic>
         <p:nvPicPr>
-          <p:cNvPr id="59" name="Picture 3"/>
+          <p:cNvPr id="61" name="Picture 3"/>
           <p:cNvPicPr>
             <a:picLocks noChangeAspect="1" noChangeArrowheads="1"/>
           </p:cNvPicPr>
           <p:nvPr/>
         </p:nvPicPr>
         <p:blipFill>
-          <a:blip r:embed="rId4">
+          <a:blip r:embed="rId3">
             <a:extLst>
               <a:ext uri="{28A0092B-C50C-407E-A947-70E740481C1C}">
                 <a14:useLocalDpi xmlns:a14="http://schemas.microsoft.com/office/drawing/2010/main" val="0"/>
@@ -12669,7 +12451,7 @@
         </p:blipFill>
         <p:spPr bwMode="auto">
           <a:xfrm>
-            <a:off x="4657833" y="756218"/>
+            <a:off x="1124744" y="3624278"/>
             <a:ext cx="904601" cy="726422"/>
           </a:xfrm>
           <a:prstGeom prst="rect">
@@ -12700,164 +12482,391 @@
           </a:extLst>
         </p:spPr>
       </p:pic>
+      <p:sp>
+        <p:nvSpPr>
+          <p:cNvPr id="62" name="文字方塊 61"/>
+          <p:cNvSpPr txBox="1"/>
+          <p:nvPr/>
+        </p:nvSpPr>
+        <p:spPr>
+          <a:xfrm>
+            <a:off x="1227975" y="957857"/>
+            <a:ext cx="668773" cy="369332"/>
+          </a:xfrm>
+          <a:prstGeom prst="rect">
+            <a:avLst/>
+          </a:prstGeom>
+          <a:noFill/>
+        </p:spPr>
+        <p:txBody>
+          <a:bodyPr wrap="none" rtlCol="0">
+            <a:spAutoFit/>
+          </a:bodyPr>
+          <a:lstStyle/>
+          <a:p>
+            <a:r>
+              <a:rPr lang="en-US" altLang="zh-TW" dirty="0" smtClean="0">
+                <a:latin typeface="Times New Roman" panose="02020603050405020304" pitchFamily="18" charset="0"/>
+                <a:cs typeface="Times New Roman" panose="02020603050405020304" pitchFamily="18" charset="0"/>
+              </a:rPr>
+              <a:t>DUT</a:t>
+            </a:r>
+            <a:endParaRPr lang="zh-TW" altLang="en-US" dirty="0">
+              <a:latin typeface="Times New Roman" panose="02020603050405020304" pitchFamily="18" charset="0"/>
+              <a:cs typeface="Times New Roman" panose="02020603050405020304" pitchFamily="18" charset="0"/>
+            </a:endParaRPr>
+          </a:p>
+        </p:txBody>
+      </p:sp>
+      <p:sp>
+        <p:nvSpPr>
+          <p:cNvPr id="68" name="文字方塊 67"/>
+          <p:cNvSpPr txBox="1"/>
+          <p:nvPr/>
+        </p:nvSpPr>
+        <p:spPr>
+          <a:xfrm>
+            <a:off x="5134460" y="2610505"/>
+            <a:ext cx="2973891" cy="369332"/>
+          </a:xfrm>
+          <a:prstGeom prst="rect">
+            <a:avLst/>
+          </a:prstGeom>
+          <a:noFill/>
+        </p:spPr>
+        <p:txBody>
+          <a:bodyPr wrap="none" rtlCol="0">
+            <a:spAutoFit/>
+          </a:bodyPr>
+          <a:lstStyle/>
+          <a:p>
+            <a:r>
+              <a:rPr lang="en-US" altLang="zh-TW" dirty="0" smtClean="0">
+                <a:latin typeface="Times New Roman" panose="02020603050405020304" pitchFamily="18" charset="0"/>
+                <a:cs typeface="Times New Roman" panose="02020603050405020304" pitchFamily="18" charset="0"/>
+              </a:rPr>
+              <a:t>Android </a:t>
+            </a:r>
+            <a:r>
+              <a:rPr lang="en-US" altLang="zh-TW" dirty="0" smtClean="0">
+                <a:latin typeface="Times New Roman" panose="02020603050405020304" pitchFamily="18" charset="0"/>
+                <a:cs typeface="Times New Roman" panose="02020603050405020304" pitchFamily="18" charset="0"/>
+              </a:rPr>
+              <a:t>6.0</a:t>
+            </a:r>
+            <a:r>
+              <a:rPr lang="zh-TW" altLang="en-US" dirty="0" smtClean="0">
+                <a:latin typeface="Times New Roman" panose="02020603050405020304" pitchFamily="18" charset="0"/>
+                <a:cs typeface="Times New Roman" panose="02020603050405020304" pitchFamily="18" charset="0"/>
+              </a:rPr>
+              <a:t>、</a:t>
+            </a:r>
+            <a:r>
+              <a:rPr lang="en-US" altLang="zh-TW" dirty="0" smtClean="0">
+                <a:latin typeface="Times New Roman" panose="02020603050405020304" pitchFamily="18" charset="0"/>
+                <a:cs typeface="Times New Roman" panose="02020603050405020304" pitchFamily="18" charset="0"/>
+              </a:rPr>
+              <a:t>8.1</a:t>
+            </a:r>
+            <a:r>
+              <a:rPr lang="zh-TW" altLang="en-US" dirty="0" smtClean="0">
+                <a:latin typeface="Times New Roman" panose="02020603050405020304" pitchFamily="18" charset="0"/>
+                <a:cs typeface="Times New Roman" panose="02020603050405020304" pitchFamily="18" charset="0"/>
+              </a:rPr>
+              <a:t>、</a:t>
+            </a:r>
+            <a:r>
+              <a:rPr lang="en-US" altLang="zh-TW" dirty="0" smtClean="0">
+                <a:latin typeface="Times New Roman" panose="02020603050405020304" pitchFamily="18" charset="0"/>
+                <a:cs typeface="Times New Roman" panose="02020603050405020304" pitchFamily="18" charset="0"/>
+              </a:rPr>
+              <a:t>9.0</a:t>
+            </a:r>
+            <a:r>
+              <a:rPr lang="zh-TW" altLang="en-US" dirty="0" smtClean="0">
+                <a:latin typeface="Times New Roman" panose="02020603050405020304" pitchFamily="18" charset="0"/>
+                <a:cs typeface="Times New Roman" panose="02020603050405020304" pitchFamily="18" charset="0"/>
+              </a:rPr>
+              <a:t>、</a:t>
+            </a:r>
+            <a:r>
+              <a:rPr lang="en-US" altLang="zh-TW" dirty="0" smtClean="0">
+                <a:latin typeface="Times New Roman" panose="02020603050405020304" pitchFamily="18" charset="0"/>
+                <a:cs typeface="Times New Roman" panose="02020603050405020304" pitchFamily="18" charset="0"/>
+              </a:rPr>
+              <a:t>10.0</a:t>
+            </a:r>
+            <a:endParaRPr lang="zh-TW" altLang="en-US" dirty="0">
+              <a:latin typeface="Times New Roman" panose="02020603050405020304" pitchFamily="18" charset="0"/>
+              <a:cs typeface="Times New Roman" panose="02020603050405020304" pitchFamily="18" charset="0"/>
+            </a:endParaRPr>
+          </a:p>
+        </p:txBody>
+      </p:sp>
+      <p:sp>
+        <p:nvSpPr>
+          <p:cNvPr id="69" name="文字方塊 68"/>
+          <p:cNvSpPr txBox="1"/>
+          <p:nvPr/>
+        </p:nvSpPr>
+        <p:spPr>
+          <a:xfrm>
+            <a:off x="5134461" y="3822028"/>
+            <a:ext cx="2973891" cy="369332"/>
+          </a:xfrm>
+          <a:prstGeom prst="rect">
+            <a:avLst/>
+          </a:prstGeom>
+          <a:noFill/>
+        </p:spPr>
+        <p:txBody>
+          <a:bodyPr wrap="none" rtlCol="0">
+            <a:spAutoFit/>
+          </a:bodyPr>
+          <a:lstStyle/>
+          <a:p>
+            <a:r>
+              <a:rPr lang="en-US" altLang="zh-TW" dirty="0">
+                <a:latin typeface="Times New Roman" panose="02020603050405020304" pitchFamily="18" charset="0"/>
+                <a:cs typeface="Times New Roman" panose="02020603050405020304" pitchFamily="18" charset="0"/>
+              </a:rPr>
+              <a:t>Android 6.0</a:t>
+            </a:r>
+            <a:r>
+              <a:rPr lang="zh-TW" altLang="en-US" dirty="0">
+                <a:latin typeface="Times New Roman" panose="02020603050405020304" pitchFamily="18" charset="0"/>
+                <a:cs typeface="Times New Roman" panose="02020603050405020304" pitchFamily="18" charset="0"/>
+              </a:rPr>
+              <a:t>、</a:t>
+            </a:r>
+            <a:r>
+              <a:rPr lang="en-US" altLang="zh-TW" dirty="0">
+                <a:latin typeface="Times New Roman" panose="02020603050405020304" pitchFamily="18" charset="0"/>
+                <a:cs typeface="Times New Roman" panose="02020603050405020304" pitchFamily="18" charset="0"/>
+              </a:rPr>
+              <a:t>8.1</a:t>
+            </a:r>
+            <a:r>
+              <a:rPr lang="zh-TW" altLang="en-US" dirty="0">
+                <a:latin typeface="Times New Roman" panose="02020603050405020304" pitchFamily="18" charset="0"/>
+                <a:cs typeface="Times New Roman" panose="02020603050405020304" pitchFamily="18" charset="0"/>
+              </a:rPr>
+              <a:t>、</a:t>
+            </a:r>
+            <a:r>
+              <a:rPr lang="en-US" altLang="zh-TW" dirty="0">
+                <a:latin typeface="Times New Roman" panose="02020603050405020304" pitchFamily="18" charset="0"/>
+                <a:cs typeface="Times New Roman" panose="02020603050405020304" pitchFamily="18" charset="0"/>
+              </a:rPr>
+              <a:t>9.0</a:t>
+            </a:r>
+            <a:r>
+              <a:rPr lang="zh-TW" altLang="en-US" dirty="0">
+                <a:latin typeface="Times New Roman" panose="02020603050405020304" pitchFamily="18" charset="0"/>
+                <a:cs typeface="Times New Roman" panose="02020603050405020304" pitchFamily="18" charset="0"/>
+              </a:rPr>
+              <a:t>、</a:t>
+            </a:r>
+            <a:r>
+              <a:rPr lang="en-US" altLang="zh-TW" dirty="0">
+                <a:latin typeface="Times New Roman" panose="02020603050405020304" pitchFamily="18" charset="0"/>
+                <a:cs typeface="Times New Roman" panose="02020603050405020304" pitchFamily="18" charset="0"/>
+              </a:rPr>
+              <a:t>10.0</a:t>
+            </a:r>
+            <a:endParaRPr lang="zh-TW" altLang="en-US" dirty="0">
+              <a:latin typeface="Times New Roman" panose="02020603050405020304" pitchFamily="18" charset="0"/>
+              <a:cs typeface="Times New Roman" panose="02020603050405020304" pitchFamily="18" charset="0"/>
+            </a:endParaRPr>
+          </a:p>
+        </p:txBody>
+      </p:sp>
+      <p:cxnSp>
+        <p:nvCxnSpPr>
+          <p:cNvPr id="70" name="弧形接點 69"/>
+          <p:cNvCxnSpPr>
+            <a:stCxn id="60" idx="3"/>
+            <a:endCxn id="11" idx="1"/>
+          </p:cNvCxnSpPr>
+          <p:nvPr/>
+        </p:nvCxnSpPr>
+        <p:spPr>
+          <a:xfrm>
+            <a:off x="2029352" y="2795172"/>
+            <a:ext cx="2445529" cy="13328"/>
+          </a:xfrm>
+          <a:prstGeom prst="curvedConnector3">
+            <a:avLst>
+              <a:gd name="adj1" fmla="val 50000"/>
+            </a:avLst>
+          </a:prstGeom>
+          <a:ln w="19050" cap="flat" cmpd="sng" algn="ctr">
+            <a:solidFill>
+              <a:schemeClr val="accent1"/>
+            </a:solidFill>
+            <a:prstDash val="solid"/>
+            <a:round/>
+            <a:headEnd type="arrow" w="med" len="med"/>
+            <a:tailEnd type="arrow" w="med" len="med"/>
+          </a:ln>
+        </p:spPr>
+        <p:style>
+          <a:lnRef idx="0">
+            <a:scrgbClr r="0" g="0" b="0"/>
+          </a:lnRef>
+          <a:fillRef idx="0">
+            <a:scrgbClr r="0" g="0" b="0"/>
+          </a:fillRef>
+          <a:effectRef idx="0">
+            <a:scrgbClr r="0" g="0" b="0"/>
+          </a:effectRef>
+          <a:fontRef idx="minor">
+            <a:schemeClr val="tx1"/>
+          </a:fontRef>
+        </p:style>
+      </p:cxnSp>
+      <p:sp>
+        <p:nvSpPr>
+          <p:cNvPr id="71" name="文字方塊 70"/>
+          <p:cNvSpPr txBox="1"/>
+          <p:nvPr/>
+        </p:nvSpPr>
+        <p:spPr>
+          <a:xfrm>
+            <a:off x="2884067" y="2438540"/>
+            <a:ext cx="736099" cy="369332"/>
+          </a:xfrm>
+          <a:prstGeom prst="rect">
+            <a:avLst/>
+          </a:prstGeom>
+          <a:noFill/>
+        </p:spPr>
+        <p:txBody>
+          <a:bodyPr wrap="none" rtlCol="0">
+            <a:spAutoFit/>
+          </a:bodyPr>
+          <a:lstStyle/>
+          <a:p>
+            <a:r>
+              <a:rPr lang="en-US" altLang="zh-TW" dirty="0" smtClean="0">
+                <a:solidFill>
+                  <a:srgbClr val="00B050"/>
+                </a:solidFill>
+                <a:latin typeface="Times New Roman" panose="02020603050405020304" pitchFamily="18" charset="0"/>
+                <a:cs typeface="Times New Roman" panose="02020603050405020304" pitchFamily="18" charset="0"/>
+              </a:rPr>
+              <a:t>RJ-45</a:t>
+            </a:r>
+            <a:endParaRPr lang="zh-TW" altLang="en-US" dirty="0">
+              <a:solidFill>
+                <a:srgbClr val="00B050"/>
+              </a:solidFill>
+              <a:latin typeface="Times New Roman" panose="02020603050405020304" pitchFamily="18" charset="0"/>
+              <a:cs typeface="Times New Roman" panose="02020603050405020304" pitchFamily="18" charset="0"/>
+            </a:endParaRPr>
+          </a:p>
+        </p:txBody>
+      </p:sp>
+      <p:cxnSp>
+        <p:nvCxnSpPr>
+          <p:cNvPr id="72" name="弧形接點 71"/>
+          <p:cNvCxnSpPr>
+            <a:stCxn id="61" idx="3"/>
+            <a:endCxn id="41" idx="1"/>
+          </p:cNvCxnSpPr>
+          <p:nvPr/>
+        </p:nvCxnSpPr>
+        <p:spPr>
+          <a:xfrm>
+            <a:off x="2029345" y="3987489"/>
+            <a:ext cx="2450890" cy="13143"/>
+          </a:xfrm>
+          <a:prstGeom prst="curvedConnector3">
+            <a:avLst>
+              <a:gd name="adj1" fmla="val 50000"/>
+            </a:avLst>
+          </a:prstGeom>
+          <a:ln w="19050" cap="flat" cmpd="sng" algn="ctr">
+            <a:solidFill>
+              <a:schemeClr val="accent1"/>
+            </a:solidFill>
+            <a:prstDash val="solid"/>
+            <a:round/>
+            <a:headEnd type="arrow" w="med" len="med"/>
+            <a:tailEnd type="arrow" w="med" len="med"/>
+          </a:ln>
+        </p:spPr>
+        <p:style>
+          <a:lnRef idx="0">
+            <a:scrgbClr r="0" g="0" b="0"/>
+          </a:lnRef>
+          <a:fillRef idx="0">
+            <a:scrgbClr r="0" g="0" b="0"/>
+          </a:fillRef>
+          <a:effectRef idx="0">
+            <a:scrgbClr r="0" g="0" b="0"/>
+          </a:effectRef>
+          <a:fontRef idx="minor">
+            <a:schemeClr val="tx1"/>
+          </a:fontRef>
+        </p:style>
+      </p:cxnSp>
+      <p:sp>
+        <p:nvSpPr>
+          <p:cNvPr id="75" name="文字方塊 74"/>
+          <p:cNvSpPr txBox="1"/>
+          <p:nvPr/>
+        </p:nvSpPr>
+        <p:spPr>
+          <a:xfrm>
+            <a:off x="2922538" y="3616389"/>
+            <a:ext cx="659155" cy="369332"/>
+          </a:xfrm>
+          <a:prstGeom prst="rect">
+            <a:avLst/>
+          </a:prstGeom>
+          <a:noFill/>
+        </p:spPr>
+        <p:txBody>
+          <a:bodyPr wrap="none" rtlCol="0">
+            <a:spAutoFit/>
+          </a:bodyPr>
+          <a:lstStyle/>
+          <a:p>
+            <a:r>
+              <a:rPr lang="en-US" altLang="zh-TW" dirty="0" smtClean="0">
+                <a:solidFill>
+                  <a:srgbClr val="00B050"/>
+                </a:solidFill>
+                <a:latin typeface="Times New Roman" panose="02020603050405020304" pitchFamily="18" charset="0"/>
+                <a:cs typeface="Times New Roman" panose="02020603050405020304" pitchFamily="18" charset="0"/>
+              </a:rPr>
+              <a:t>OTG</a:t>
+            </a:r>
+            <a:endParaRPr lang="zh-TW" altLang="en-US" dirty="0">
+              <a:solidFill>
+                <a:srgbClr val="00B050"/>
+              </a:solidFill>
+              <a:latin typeface="Times New Roman" panose="02020603050405020304" pitchFamily="18" charset="0"/>
+              <a:cs typeface="Times New Roman" panose="02020603050405020304" pitchFamily="18" charset="0"/>
+            </a:endParaRPr>
+          </a:p>
+        </p:txBody>
+      </p:sp>
       <p:pic>
         <p:nvPicPr>
-          <p:cNvPr id="60" name="Picture 3"/>
+          <p:cNvPr id="84" name="Picture 9" descr="D:\Users\ZL.chen\Desktop\download.png"/>
           <p:cNvPicPr>
             <a:picLocks noChangeAspect="1" noChangeArrowheads="1"/>
           </p:cNvPicPr>
           <p:nvPr/>
         </p:nvPicPr>
         <p:blipFill>
-          <a:blip r:embed="rId4">
-            <a:extLst>
-              <a:ext uri="{28A0092B-C50C-407E-A947-70E740481C1C}">
-                <a14:useLocalDpi xmlns:a14="http://schemas.microsoft.com/office/drawing/2010/main" val="0"/>
-              </a:ext>
-            </a:extLst>
-          </a:blip>
-          <a:srcRect/>
-          <a:stretch>
-            <a:fillRect/>
-          </a:stretch>
-        </p:blipFill>
-        <p:spPr bwMode="auto">
-          <a:xfrm>
-            <a:off x="1421007" y="2174005"/>
-            <a:ext cx="904601" cy="726422"/>
-          </a:xfrm>
-          <a:prstGeom prst="rect">
-            <a:avLst/>
-          </a:prstGeom>
-          <a:noFill/>
-          <a:ln>
-            <a:noFill/>
-          </a:ln>
-          <a:extLst>
-            <a:ext uri="{909E8E84-426E-40DD-AFC4-6F175D3DCCD1}">
-              <a14:hiddenFill xmlns:a14="http://schemas.microsoft.com/office/drawing/2010/main">
-                <a:solidFill>
-                  <a:schemeClr val="accent1"/>
-                </a:solidFill>
-              </a14:hiddenFill>
-            </a:ext>
-            <a:ext uri="{91240B29-F687-4F45-9708-019B960494DF}">
-              <a14:hiddenLine xmlns:a14="http://schemas.microsoft.com/office/drawing/2010/main" w="9525">
-                <a:solidFill>
-                  <a:schemeClr val="tx1"/>
-                </a:solidFill>
-                <a:miter lim="800000"/>
-                <a:headEnd/>
-                <a:tailEnd/>
-              </a14:hiddenLine>
-            </a:ext>
-          </a:extLst>
-        </p:spPr>
-      </p:pic>
-      <p:pic>
-        <p:nvPicPr>
-          <p:cNvPr id="61" name="Picture 3"/>
-          <p:cNvPicPr>
-            <a:picLocks noChangeAspect="1" noChangeArrowheads="1"/>
-          </p:cNvPicPr>
-          <p:nvPr/>
-        </p:nvPicPr>
-        <p:blipFill>
-          <a:blip r:embed="rId4">
-            <a:extLst>
-              <a:ext uri="{28A0092B-C50C-407E-A947-70E740481C1C}">
-                <a14:useLocalDpi xmlns:a14="http://schemas.microsoft.com/office/drawing/2010/main" val="0"/>
-              </a:ext>
-            </a:extLst>
-          </a:blip>
-          <a:srcRect/>
-          <a:stretch>
-            <a:fillRect/>
-          </a:stretch>
-        </p:blipFill>
-        <p:spPr bwMode="auto">
-          <a:xfrm>
-            <a:off x="1421000" y="3607629"/>
-            <a:ext cx="904601" cy="726422"/>
-          </a:xfrm>
-          <a:prstGeom prst="rect">
-            <a:avLst/>
-          </a:prstGeom>
-          <a:noFill/>
-          <a:ln>
-            <a:noFill/>
-          </a:ln>
-          <a:extLst>
-            <a:ext uri="{909E8E84-426E-40DD-AFC4-6F175D3DCCD1}">
-              <a14:hiddenFill xmlns:a14="http://schemas.microsoft.com/office/drawing/2010/main">
-                <a:solidFill>
-                  <a:schemeClr val="accent1"/>
-                </a:solidFill>
-              </a14:hiddenFill>
-            </a:ext>
-            <a:ext uri="{91240B29-F687-4F45-9708-019B960494DF}">
-              <a14:hiddenLine xmlns:a14="http://schemas.microsoft.com/office/drawing/2010/main" w="9525">
-                <a:solidFill>
-                  <a:schemeClr val="tx1"/>
-                </a:solidFill>
-                <a:miter lim="800000"/>
-                <a:headEnd/>
-                <a:tailEnd/>
-              </a14:hiddenLine>
-            </a:ext>
-          </a:extLst>
-        </p:spPr>
-      </p:pic>
-      <p:sp>
-        <p:nvSpPr>
-          <p:cNvPr id="62" name="文字方塊 61"/>
-          <p:cNvSpPr txBox="1"/>
-          <p:nvPr/>
-        </p:nvSpPr>
-        <p:spPr>
-          <a:xfrm>
-            <a:off x="4771147" y="181001"/>
-            <a:ext cx="668773" cy="369332"/>
-          </a:xfrm>
-          <a:prstGeom prst="rect">
-            <a:avLst/>
-          </a:prstGeom>
-          <a:noFill/>
-        </p:spPr>
-        <p:txBody>
-          <a:bodyPr wrap="none" rtlCol="0">
-            <a:spAutoFit/>
-          </a:bodyPr>
-          <a:lstStyle/>
-          <a:p>
-            <a:r>
-              <a:rPr lang="en-US" altLang="zh-TW" dirty="0" smtClean="0">
-                <a:latin typeface="Times New Roman" panose="02020603050405020304" pitchFamily="18" charset="0"/>
-                <a:cs typeface="Times New Roman" panose="02020603050405020304" pitchFamily="18" charset="0"/>
-              </a:rPr>
-              <a:t>DUT</a:t>
-            </a:r>
-            <a:endParaRPr lang="zh-TW" altLang="en-US" dirty="0">
-              <a:latin typeface="Times New Roman" panose="02020603050405020304" pitchFamily="18" charset="0"/>
-              <a:cs typeface="Times New Roman" panose="02020603050405020304" pitchFamily="18" charset="0"/>
-            </a:endParaRPr>
-          </a:p>
-        </p:txBody>
-      </p:sp>
-      <p:pic>
-        <p:nvPicPr>
-          <p:cNvPr id="63" name="Picture 9" descr="D:\Users\ZL.chen\Desktop\download.png"/>
-          <p:cNvPicPr>
-            <a:picLocks noChangeAspect="1" noChangeArrowheads="1"/>
-          </p:cNvPicPr>
-          <p:nvPr/>
-        </p:nvPicPr>
-        <p:blipFill>
-          <a:blip r:embed="rId5" cstate="print">
+          <a:blip r:embed="rId4" cstate="print">
             <a:extLst>
               <a:ext uri="{BEBA8EAE-BF5A-486C-A8C5-ECC9F3942E4B}">
                 <a14:imgProps xmlns:a14="http://schemas.microsoft.com/office/drawing/2010/main">
-                  <a14:imgLayer r:embed="rId6">
+                  <a14:imgLayer r:embed="rId5">
                     <a14:imgEffect>
                       <a14:backgroundRemoval t="8000" b="93333" l="4889" r="94667">
                         <a14:backgroundMark x1="11556" y1="84444" x2="11556" y2="84444"/>
@@ -12882,8 +12891,8 @@
         </p:blipFill>
         <p:spPr bwMode="auto">
           <a:xfrm rot="1856530">
-            <a:off x="431915" y="1962748"/>
-            <a:ext cx="834017" cy="834017"/>
+            <a:off x="2006520" y="1092559"/>
+            <a:ext cx="248314" cy="248314"/>
           </a:xfrm>
           <a:prstGeom prst="rect">
             <a:avLst/>
@@ -12902,14 +12911,14 @@
       </p:pic>
       <p:sp>
         <p:nvSpPr>
-          <p:cNvPr id="64" name="文字方塊 63"/>
+          <p:cNvPr id="85" name="文字方塊 84"/>
           <p:cNvSpPr txBox="1"/>
           <p:nvPr/>
         </p:nvSpPr>
         <p:spPr>
           <a:xfrm>
-            <a:off x="288321" y="2716977"/>
-            <a:ext cx="1178528" cy="369332"/>
+            <a:off x="2250863" y="1065931"/>
+            <a:ext cx="957313" cy="307777"/>
           </a:xfrm>
           <a:prstGeom prst="rect">
             <a:avLst/>
@@ -12923,13 +12932,13 @@
           <a:lstStyle/>
           <a:p>
             <a:r>
-              <a:rPr lang="en-US" altLang="zh-TW" dirty="0" smtClean="0">
+              <a:rPr lang="en-US" altLang="zh-TW" sz="1400" dirty="0" smtClean="0">
                 <a:latin typeface="Times New Roman" panose="02020603050405020304" pitchFamily="18" charset="0"/>
                 <a:cs typeface="Times New Roman" panose="02020603050405020304" pitchFamily="18" charset="0"/>
               </a:rPr>
               <a:t>Run Script</a:t>
             </a:r>
-            <a:endParaRPr lang="zh-TW" altLang="en-US" dirty="0">
+            <a:endParaRPr lang="zh-TW" altLang="en-US" sz="1400" dirty="0">
               <a:latin typeface="Times New Roman" panose="02020603050405020304" pitchFamily="18" charset="0"/>
               <a:cs typeface="Times New Roman" panose="02020603050405020304" pitchFamily="18" charset="0"/>
             </a:endParaRPr>
@@ -12938,18 +12947,311 @@
       </p:sp>
       <p:pic>
         <p:nvPicPr>
-          <p:cNvPr id="65" name="Picture 9" descr="D:\Users\ZL.chen\Desktop\download.png"/>
+          <p:cNvPr id="86" name="Picture 3" descr="D:\Users\ZL.chen\Desktop\P_setting_fff_1_nd_500.jpg"/>
           <p:cNvPicPr>
             <a:picLocks noChangeAspect="1" noChangeArrowheads="1"/>
           </p:cNvPicPr>
           <p:nvPr/>
         </p:nvPicPr>
         <p:blipFill>
-          <a:blip r:embed="rId5" cstate="print">
+          <a:blip r:embed="rId6" cstate="print">
             <a:extLst>
               <a:ext uri="{BEBA8EAE-BF5A-486C-A8C5-ECC9F3942E4B}">
                 <a14:imgProps xmlns:a14="http://schemas.microsoft.com/office/drawing/2010/main">
-                  <a14:imgLayer r:embed="rId6">
+                  <a14:imgLayer r:embed="rId7">
+                    <a14:imgEffect>
+                      <a14:backgroundRemoval t="10000" b="90000" l="10000" r="90000"/>
+                    </a14:imgEffect>
+                  </a14:imgLayer>
+                </a14:imgProps>
+              </a:ext>
+              <a:ext uri="{28A0092B-C50C-407E-A947-70E740481C1C}">
+                <a14:useLocalDpi xmlns:a14="http://schemas.microsoft.com/office/drawing/2010/main" val="0"/>
+              </a:ext>
+            </a:extLst>
+          </a:blip>
+          <a:srcRect/>
+          <a:stretch>
+            <a:fillRect/>
+          </a:stretch>
+        </p:blipFill>
+        <p:spPr bwMode="auto">
+          <a:xfrm>
+            <a:off x="7472348" y="705521"/>
+            <a:ext cx="641690" cy="641690"/>
+          </a:xfrm>
+          <a:prstGeom prst="rect">
+            <a:avLst/>
+          </a:prstGeom>
+          <a:noFill/>
+          <a:extLst>
+            <a:ext uri="{909E8E84-426E-40DD-AFC4-6F175D3DCCD1}">
+              <a14:hiddenFill xmlns:a14="http://schemas.microsoft.com/office/drawing/2010/main">
+                <a:solidFill>
+                  <a:srgbClr val="FFFFFF"/>
+                </a:solidFill>
+              </a14:hiddenFill>
+            </a:ext>
+          </a:extLst>
+        </p:spPr>
+      </p:pic>
+      <p:sp>
+        <p:nvSpPr>
+          <p:cNvPr id="87" name="文字方塊 86"/>
+          <p:cNvSpPr txBox="1"/>
+          <p:nvPr/>
+        </p:nvSpPr>
+        <p:spPr>
+          <a:xfrm>
+            <a:off x="7553383" y="303271"/>
+            <a:ext cx="479618" cy="369332"/>
+          </a:xfrm>
+          <a:prstGeom prst="rect">
+            <a:avLst/>
+          </a:prstGeom>
+          <a:noFill/>
+        </p:spPr>
+        <p:txBody>
+          <a:bodyPr wrap="none" rtlCol="0">
+            <a:spAutoFit/>
+          </a:bodyPr>
+          <a:lstStyle/>
+          <a:p>
+            <a:r>
+              <a:rPr lang="en-US" altLang="zh-TW" dirty="0" smtClean="0">
+                <a:latin typeface="Times New Roman" panose="02020603050405020304" pitchFamily="18" charset="0"/>
+                <a:cs typeface="Times New Roman" panose="02020603050405020304" pitchFamily="18" charset="0"/>
+              </a:rPr>
+              <a:t>AP</a:t>
+            </a:r>
+            <a:endParaRPr lang="zh-TW" altLang="en-US" dirty="0">
+              <a:latin typeface="Times New Roman" panose="02020603050405020304" pitchFamily="18" charset="0"/>
+              <a:cs typeface="Times New Roman" panose="02020603050405020304" pitchFamily="18" charset="0"/>
+            </a:endParaRPr>
+          </a:p>
+        </p:txBody>
+      </p:sp>
+      <p:pic>
+        <p:nvPicPr>
+          <p:cNvPr id="13" name="圖片 12"/>
+          <p:cNvPicPr>
+            <a:picLocks noChangeAspect="1"/>
+          </p:cNvPicPr>
+          <p:nvPr/>
+        </p:nvPicPr>
+        <p:blipFill>
+          <a:blip r:embed="rId8" cstate="print">
+            <a:extLst>
+              <a:ext uri="{28A0092B-C50C-407E-A947-70E740481C1C}">
+                <a14:useLocalDpi xmlns:a14="http://schemas.microsoft.com/office/drawing/2010/main" val="0"/>
+              </a:ext>
+            </a:extLst>
+          </a:blip>
+          <a:stretch>
+            <a:fillRect/>
+          </a:stretch>
+        </p:blipFill>
+        <p:spPr>
+          <a:xfrm rot="4102625" flipH="1">
+            <a:off x="8128913" y="732819"/>
+            <a:ext cx="303871" cy="303871"/>
+          </a:xfrm>
+          <a:prstGeom prst="rect">
+            <a:avLst/>
+          </a:prstGeom>
+        </p:spPr>
+      </p:pic>
+      <p:pic>
+        <p:nvPicPr>
+          <p:cNvPr id="90" name="圖片 89"/>
+          <p:cNvPicPr>
+            <a:picLocks noChangeAspect="1"/>
+          </p:cNvPicPr>
+          <p:nvPr/>
+        </p:nvPicPr>
+        <p:blipFill>
+          <a:blip r:embed="rId8" cstate="print">
+            <a:extLst>
+              <a:ext uri="{28A0092B-C50C-407E-A947-70E740481C1C}">
+                <a14:useLocalDpi xmlns:a14="http://schemas.microsoft.com/office/drawing/2010/main" val="0"/>
+              </a:ext>
+            </a:extLst>
+          </a:blip>
+          <a:stretch>
+            <a:fillRect/>
+          </a:stretch>
+        </p:blipFill>
+        <p:spPr>
+          <a:xfrm rot="11306932" flipH="1">
+            <a:off x="7576187" y="1413396"/>
+            <a:ext cx="303871" cy="303871"/>
+          </a:xfrm>
+          <a:prstGeom prst="rect">
+            <a:avLst/>
+          </a:prstGeom>
+        </p:spPr>
+      </p:pic>
+      <p:pic>
+        <p:nvPicPr>
+          <p:cNvPr id="92" name="圖片 91"/>
+          <p:cNvPicPr>
+            <a:picLocks noChangeAspect="1"/>
+          </p:cNvPicPr>
+          <p:nvPr/>
+        </p:nvPicPr>
+        <p:blipFill>
+          <a:blip r:embed="rId8" cstate="print">
+            <a:extLst>
+              <a:ext uri="{28A0092B-C50C-407E-A947-70E740481C1C}">
+                <a14:useLocalDpi xmlns:a14="http://schemas.microsoft.com/office/drawing/2010/main" val="0"/>
+              </a:ext>
+            </a:extLst>
+          </a:blip>
+          <a:stretch>
+            <a:fillRect/>
+          </a:stretch>
+        </p:blipFill>
+        <p:spPr>
+          <a:xfrm rot="18245489" flipH="1">
+            <a:off x="7139845" y="719063"/>
+            <a:ext cx="303871" cy="303871"/>
+          </a:xfrm>
+          <a:prstGeom prst="rect">
+            <a:avLst/>
+          </a:prstGeom>
+        </p:spPr>
+      </p:pic>
+      <p:cxnSp>
+        <p:nvCxnSpPr>
+          <p:cNvPr id="7" name="直線接點 6"/>
+          <p:cNvCxnSpPr/>
+          <p:nvPr/>
+        </p:nvCxnSpPr>
+        <p:spPr>
+          <a:xfrm>
+            <a:off x="987780" y="2177332"/>
+            <a:ext cx="7014286" cy="0"/>
+          </a:xfrm>
+          <a:prstGeom prst="line">
+            <a:avLst/>
+          </a:prstGeom>
+          <a:ln w="9525" cap="flat" cmpd="sng" algn="ctr">
+            <a:solidFill>
+              <a:schemeClr val="dk1"/>
+            </a:solidFill>
+            <a:prstDash val="dash"/>
+            <a:round/>
+            <a:headEnd type="none" w="med" len="med"/>
+            <a:tailEnd type="none" w="med" len="med"/>
+          </a:ln>
+        </p:spPr>
+        <p:style>
+          <a:lnRef idx="0">
+            <a:scrgbClr r="0" g="0" b="0"/>
+          </a:lnRef>
+          <a:fillRef idx="0">
+            <a:scrgbClr r="0" g="0" b="0"/>
+          </a:fillRef>
+          <a:effectRef idx="0">
+            <a:scrgbClr r="0" g="0" b="0"/>
+          </a:effectRef>
+          <a:fontRef idx="minor">
+            <a:schemeClr val="tx1"/>
+          </a:fontRef>
+        </p:style>
+      </p:cxnSp>
+      <p:cxnSp>
+        <p:nvCxnSpPr>
+          <p:cNvPr id="29" name="直線接點 28"/>
+          <p:cNvCxnSpPr/>
+          <p:nvPr/>
+        </p:nvCxnSpPr>
+        <p:spPr>
+          <a:xfrm>
+            <a:off x="987780" y="3387408"/>
+            <a:ext cx="7014286" cy="0"/>
+          </a:xfrm>
+          <a:prstGeom prst="line">
+            <a:avLst/>
+          </a:prstGeom>
+          <a:ln w="9525" cap="flat" cmpd="sng" algn="ctr">
+            <a:solidFill>
+              <a:schemeClr val="dk1"/>
+            </a:solidFill>
+            <a:prstDash val="dash"/>
+            <a:round/>
+            <a:headEnd type="none" w="med" len="med"/>
+            <a:tailEnd type="none" w="med" len="med"/>
+          </a:ln>
+        </p:spPr>
+        <p:style>
+          <a:lnRef idx="0">
+            <a:scrgbClr r="0" g="0" b="0"/>
+          </a:lnRef>
+          <a:fillRef idx="0">
+            <a:scrgbClr r="0" g="0" b="0"/>
+          </a:fillRef>
+          <a:effectRef idx="0">
+            <a:scrgbClr r="0" g="0" b="0"/>
+          </a:effectRef>
+          <a:fontRef idx="minor">
+            <a:schemeClr val="tx1"/>
+          </a:fontRef>
+        </p:style>
+      </p:cxnSp>
+      <p:cxnSp>
+        <p:nvCxnSpPr>
+          <p:cNvPr id="30" name="直線接點 29"/>
+          <p:cNvCxnSpPr/>
+          <p:nvPr/>
+        </p:nvCxnSpPr>
+        <p:spPr>
+          <a:xfrm>
+            <a:off x="987780" y="4586753"/>
+            <a:ext cx="7014286" cy="0"/>
+          </a:xfrm>
+          <a:prstGeom prst="line">
+            <a:avLst/>
+          </a:prstGeom>
+          <a:ln w="9525" cap="flat" cmpd="sng" algn="ctr">
+            <a:solidFill>
+              <a:schemeClr val="dk1"/>
+            </a:solidFill>
+            <a:prstDash val="dash"/>
+            <a:round/>
+            <a:headEnd type="none" w="med" len="med"/>
+            <a:tailEnd type="none" w="med" len="med"/>
+          </a:ln>
+        </p:spPr>
+        <p:style>
+          <a:lnRef idx="0">
+            <a:scrgbClr r="0" g="0" b="0"/>
+          </a:lnRef>
+          <a:fillRef idx="0">
+            <a:scrgbClr r="0" g="0" b="0"/>
+          </a:fillRef>
+          <a:effectRef idx="0">
+            <a:scrgbClr r="0" g="0" b="0"/>
+          </a:effectRef>
+          <a:fontRef idx="minor">
+            <a:schemeClr val="tx1"/>
+          </a:fontRef>
+        </p:style>
+      </p:cxnSp>
+      <p:pic>
+        <p:nvPicPr>
+          <p:cNvPr id="31" name="Picture 9" descr="D:\Users\ZL.chen\Desktop\download.png"/>
+          <p:cNvPicPr>
+            <a:picLocks noChangeAspect="1" noChangeArrowheads="1"/>
+          </p:cNvPicPr>
+          <p:nvPr/>
+        </p:nvPicPr>
+        <p:blipFill>
+          <a:blip r:embed="rId4" cstate="print">
+            <a:extLst>
+              <a:ext uri="{BEBA8EAE-BF5A-486C-A8C5-ECC9F3942E4B}">
+                <a14:imgProps xmlns:a14="http://schemas.microsoft.com/office/drawing/2010/main">
+                  <a14:imgLayer r:embed="rId5">
                     <a14:imgEffect>
                       <a14:backgroundRemoval t="8000" b="93333" l="4889" r="94667">
                         <a14:backgroundMark x1="11556" y1="84444" x2="11556" y2="84444"/>
@@ -12974,8 +13276,8 @@
         </p:blipFill>
         <p:spPr bwMode="auto">
           <a:xfrm rot="1856530">
-            <a:off x="431912" y="3503051"/>
-            <a:ext cx="834017" cy="834017"/>
+            <a:off x="2027266" y="2230247"/>
+            <a:ext cx="248314" cy="248314"/>
           </a:xfrm>
           <a:prstGeom prst="rect">
             <a:avLst/>
@@ -12994,14 +13296,14 @@
       </p:pic>
       <p:sp>
         <p:nvSpPr>
-          <p:cNvPr id="66" name="文字方塊 65"/>
+          <p:cNvPr id="32" name="文字方塊 31"/>
           <p:cNvSpPr txBox="1"/>
           <p:nvPr/>
         </p:nvSpPr>
         <p:spPr>
           <a:xfrm>
-            <a:off x="288318" y="4257280"/>
-            <a:ext cx="1178528" cy="369332"/>
+            <a:off x="2271609" y="2203619"/>
+            <a:ext cx="957313" cy="307777"/>
           </a:xfrm>
           <a:prstGeom prst="rect">
             <a:avLst/>
@@ -13015,301 +13317,33 @@
           <a:lstStyle/>
           <a:p>
             <a:r>
-              <a:rPr lang="en-US" altLang="zh-TW" dirty="0" smtClean="0">
+              <a:rPr lang="en-US" altLang="zh-TW" sz="1400" dirty="0" smtClean="0">
                 <a:latin typeface="Times New Roman" panose="02020603050405020304" pitchFamily="18" charset="0"/>
                 <a:cs typeface="Times New Roman" panose="02020603050405020304" pitchFamily="18" charset="0"/>
               </a:rPr>
               <a:t>Run Script</a:t>
             </a:r>
-            <a:endParaRPr lang="zh-TW" altLang="en-US" dirty="0">
+            <a:endParaRPr lang="zh-TW" altLang="en-US" sz="1400" dirty="0">
               <a:latin typeface="Times New Roman" panose="02020603050405020304" pitchFamily="18" charset="0"/>
               <a:cs typeface="Times New Roman" panose="02020603050405020304" pitchFamily="18" charset="0"/>
             </a:endParaRPr>
           </a:p>
         </p:txBody>
       </p:sp>
-      <p:sp>
-        <p:nvSpPr>
-          <p:cNvPr id="67" name="文字方塊 66"/>
-          <p:cNvSpPr txBox="1"/>
-          <p:nvPr/>
-        </p:nvSpPr>
-        <p:spPr>
-          <a:xfrm>
-            <a:off x="5670680" y="756218"/>
-            <a:ext cx="1060290" cy="369332"/>
-          </a:xfrm>
-          <a:prstGeom prst="rect">
-            <a:avLst/>
-          </a:prstGeom>
-          <a:noFill/>
-        </p:spPr>
-        <p:txBody>
-          <a:bodyPr wrap="none" rtlCol="0">
-            <a:spAutoFit/>
-          </a:bodyPr>
-          <a:lstStyle/>
-          <a:p>
-            <a:r>
-              <a:rPr lang="en-US" altLang="zh-TW" dirty="0" smtClean="0">
-                <a:latin typeface="Times New Roman" panose="02020603050405020304" pitchFamily="18" charset="0"/>
-                <a:cs typeface="Times New Roman" panose="02020603050405020304" pitchFamily="18" charset="0"/>
-              </a:rPr>
-              <a:t>Windows</a:t>
-            </a:r>
-            <a:endParaRPr lang="zh-TW" altLang="en-US" dirty="0">
-              <a:latin typeface="Times New Roman" panose="02020603050405020304" pitchFamily="18" charset="0"/>
-              <a:cs typeface="Times New Roman" panose="02020603050405020304" pitchFamily="18" charset="0"/>
-            </a:endParaRPr>
-          </a:p>
-        </p:txBody>
-      </p:sp>
-      <p:sp>
-        <p:nvSpPr>
-          <p:cNvPr id="68" name="文字方塊 67"/>
-          <p:cNvSpPr txBox="1"/>
-          <p:nvPr/>
-        </p:nvSpPr>
-        <p:spPr>
-          <a:xfrm>
-            <a:off x="5670680" y="1992669"/>
-            <a:ext cx="1954381" cy="369332"/>
-          </a:xfrm>
-          <a:prstGeom prst="rect">
-            <a:avLst/>
-          </a:prstGeom>
-          <a:noFill/>
-        </p:spPr>
-        <p:txBody>
-          <a:bodyPr wrap="none" rtlCol="0">
-            <a:spAutoFit/>
-          </a:bodyPr>
-          <a:lstStyle/>
-          <a:p>
-            <a:r>
-              <a:rPr lang="en-US" altLang="zh-TW" dirty="0" smtClean="0">
-                <a:latin typeface="Times New Roman" panose="02020603050405020304" pitchFamily="18" charset="0"/>
-                <a:cs typeface="Times New Roman" panose="02020603050405020304" pitchFamily="18" charset="0"/>
-              </a:rPr>
-              <a:t>Android 6. 0 or 8.1</a:t>
-            </a:r>
-            <a:endParaRPr lang="zh-TW" altLang="en-US" dirty="0">
-              <a:latin typeface="Times New Roman" panose="02020603050405020304" pitchFamily="18" charset="0"/>
-              <a:cs typeface="Times New Roman" panose="02020603050405020304" pitchFamily="18" charset="0"/>
-            </a:endParaRPr>
-          </a:p>
-        </p:txBody>
-      </p:sp>
-      <p:sp>
-        <p:nvSpPr>
-          <p:cNvPr id="69" name="文字方塊 68"/>
-          <p:cNvSpPr txBox="1"/>
-          <p:nvPr/>
-        </p:nvSpPr>
-        <p:spPr>
-          <a:xfrm>
-            <a:off x="5670680" y="3421748"/>
-            <a:ext cx="1954381" cy="369332"/>
-          </a:xfrm>
-          <a:prstGeom prst="rect">
-            <a:avLst/>
-          </a:prstGeom>
-          <a:noFill/>
-        </p:spPr>
-        <p:txBody>
-          <a:bodyPr wrap="none" rtlCol="0">
-            <a:spAutoFit/>
-          </a:bodyPr>
-          <a:lstStyle/>
-          <a:p>
-            <a:r>
-              <a:rPr lang="en-US" altLang="zh-TW" dirty="0" smtClean="0">
-                <a:latin typeface="Times New Roman" panose="02020603050405020304" pitchFamily="18" charset="0"/>
-                <a:cs typeface="Times New Roman" panose="02020603050405020304" pitchFamily="18" charset="0"/>
-              </a:rPr>
-              <a:t>Android 6. 0 or 8.1</a:t>
-            </a:r>
-            <a:endParaRPr lang="zh-TW" altLang="en-US" dirty="0">
-              <a:latin typeface="Times New Roman" panose="02020603050405020304" pitchFamily="18" charset="0"/>
-              <a:cs typeface="Times New Roman" panose="02020603050405020304" pitchFamily="18" charset="0"/>
-            </a:endParaRPr>
-          </a:p>
-        </p:txBody>
-      </p:sp>
-      <p:cxnSp>
-        <p:nvCxnSpPr>
-          <p:cNvPr id="70" name="弧形接點 69"/>
-          <p:cNvCxnSpPr>
-            <a:stCxn id="60" idx="0"/>
-            <a:endCxn id="1029" idx="0"/>
-          </p:cNvCxnSpPr>
-          <p:nvPr/>
-        </p:nvCxnSpPr>
-        <p:spPr>
-          <a:xfrm rot="5400000" flipH="1" flipV="1">
-            <a:off x="3394179" y="467252"/>
-            <a:ext cx="185882" cy="3227625"/>
-          </a:xfrm>
-          <a:prstGeom prst="curvedConnector3">
-            <a:avLst>
-              <a:gd name="adj1" fmla="val 222981"/>
-            </a:avLst>
-          </a:prstGeom>
-          <a:ln>
-            <a:tailEnd type="arrow"/>
-          </a:ln>
-        </p:spPr>
-        <p:style>
-          <a:lnRef idx="1">
-            <a:schemeClr val="accent1"/>
-          </a:lnRef>
-          <a:fillRef idx="0">
-            <a:schemeClr val="accent1"/>
-          </a:fillRef>
-          <a:effectRef idx="0">
-            <a:schemeClr val="accent1"/>
-          </a:effectRef>
-          <a:fontRef idx="minor">
-            <a:schemeClr val="tx1"/>
-          </a:fontRef>
-        </p:style>
-      </p:cxnSp>
-      <p:sp>
-        <p:nvSpPr>
-          <p:cNvPr id="71" name="文字方塊 70"/>
-          <p:cNvSpPr txBox="1"/>
-          <p:nvPr/>
-        </p:nvSpPr>
-        <p:spPr>
-          <a:xfrm>
-            <a:off x="3139108" y="1896398"/>
-            <a:ext cx="736099" cy="369332"/>
-          </a:xfrm>
-          <a:prstGeom prst="rect">
-            <a:avLst/>
-          </a:prstGeom>
-          <a:noFill/>
-        </p:spPr>
-        <p:txBody>
-          <a:bodyPr wrap="none" rtlCol="0">
-            <a:spAutoFit/>
-          </a:bodyPr>
-          <a:lstStyle/>
-          <a:p>
-            <a:r>
-              <a:rPr lang="en-US" altLang="zh-TW" dirty="0" smtClean="0">
-                <a:solidFill>
-                  <a:srgbClr val="00B050"/>
-                </a:solidFill>
-                <a:latin typeface="Times New Roman" panose="02020603050405020304" pitchFamily="18" charset="0"/>
-                <a:cs typeface="Times New Roman" panose="02020603050405020304" pitchFamily="18" charset="0"/>
-              </a:rPr>
-              <a:t>RJ-45</a:t>
-            </a:r>
-            <a:endParaRPr lang="zh-TW" altLang="en-US" dirty="0">
-              <a:solidFill>
-                <a:srgbClr val="00B050"/>
-              </a:solidFill>
-              <a:latin typeface="Times New Roman" panose="02020603050405020304" pitchFamily="18" charset="0"/>
-              <a:cs typeface="Times New Roman" panose="02020603050405020304" pitchFamily="18" charset="0"/>
-            </a:endParaRPr>
-          </a:p>
-        </p:txBody>
-      </p:sp>
-      <p:cxnSp>
-        <p:nvCxnSpPr>
-          <p:cNvPr id="72" name="弧形接點 71"/>
-          <p:cNvCxnSpPr>
-            <a:stCxn id="61" idx="0"/>
-            <a:endCxn id="55" idx="0"/>
-          </p:cNvCxnSpPr>
-          <p:nvPr/>
-        </p:nvCxnSpPr>
-        <p:spPr>
-          <a:xfrm rot="5400000" flipH="1" flipV="1">
-            <a:off x="3394176" y="1900874"/>
-            <a:ext cx="185881" cy="3227631"/>
-          </a:xfrm>
-          <a:prstGeom prst="curvedConnector3">
-            <a:avLst>
-              <a:gd name="adj1" fmla="val 222982"/>
-            </a:avLst>
-          </a:prstGeom>
-          <a:ln>
-            <a:tailEnd type="arrow"/>
-          </a:ln>
-        </p:spPr>
-        <p:style>
-          <a:lnRef idx="1">
-            <a:schemeClr val="accent1"/>
-          </a:lnRef>
-          <a:fillRef idx="0">
-            <a:schemeClr val="accent1"/>
-          </a:fillRef>
-          <a:effectRef idx="0">
-            <a:schemeClr val="accent1"/>
-          </a:effectRef>
-          <a:fontRef idx="minor">
-            <a:schemeClr val="tx1"/>
-          </a:fontRef>
-        </p:style>
-      </p:cxnSp>
-      <p:sp>
-        <p:nvSpPr>
-          <p:cNvPr id="75" name="文字方塊 74"/>
-          <p:cNvSpPr txBox="1"/>
-          <p:nvPr/>
-        </p:nvSpPr>
-        <p:spPr>
-          <a:xfrm>
-            <a:off x="3139104" y="3245236"/>
-            <a:ext cx="659155" cy="369332"/>
-          </a:xfrm>
-          <a:prstGeom prst="rect">
-            <a:avLst/>
-          </a:prstGeom>
-          <a:noFill/>
-        </p:spPr>
-        <p:txBody>
-          <a:bodyPr wrap="none" rtlCol="0">
-            <a:spAutoFit/>
-          </a:bodyPr>
-          <a:lstStyle/>
-          <a:p>
-            <a:r>
-              <a:rPr lang="en-US" altLang="zh-TW" dirty="0" smtClean="0">
-                <a:solidFill>
-                  <a:srgbClr val="00B050"/>
-                </a:solidFill>
-                <a:latin typeface="Times New Roman" panose="02020603050405020304" pitchFamily="18" charset="0"/>
-                <a:cs typeface="Times New Roman" panose="02020603050405020304" pitchFamily="18" charset="0"/>
-              </a:rPr>
-              <a:t>OTG</a:t>
-            </a:r>
-            <a:endParaRPr lang="zh-TW" altLang="en-US" dirty="0">
-              <a:solidFill>
-                <a:srgbClr val="00B050"/>
-              </a:solidFill>
-              <a:latin typeface="Times New Roman" panose="02020603050405020304" pitchFamily="18" charset="0"/>
-              <a:cs typeface="Times New Roman" panose="02020603050405020304" pitchFamily="18" charset="0"/>
-            </a:endParaRPr>
-          </a:p>
-        </p:txBody>
-      </p:sp>
       <p:pic>
         <p:nvPicPr>
-          <p:cNvPr id="76" name="Picture 9" descr="D:\Users\ZL.chen\Desktop\download.png"/>
+          <p:cNvPr id="33" name="Picture 9" descr="D:\Users\ZL.chen\Desktop\download.png"/>
           <p:cNvPicPr>
             <a:picLocks noChangeAspect="1" noChangeArrowheads="1"/>
           </p:cNvPicPr>
           <p:nvPr/>
         </p:nvPicPr>
         <p:blipFill>
-          <a:blip r:embed="rId5" cstate="print">
+          <a:blip r:embed="rId4" cstate="print">
             <a:extLst>
               <a:ext uri="{BEBA8EAE-BF5A-486C-A8C5-ECC9F3942E4B}">
                 <a14:imgProps xmlns:a14="http://schemas.microsoft.com/office/drawing/2010/main">
-                  <a14:imgLayer r:embed="rId6">
+                  <a14:imgLayer r:embed="rId5">
                     <a14:imgEffect>
                       <a14:backgroundRemoval t="8000" b="93333" l="4889" r="94667">
                         <a14:backgroundMark x1="11556" y1="84444" x2="11556" y2="84444"/>
@@ -13334,8 +13368,8 @@
         </p:blipFill>
         <p:spPr bwMode="auto">
           <a:xfrm rot="1856530">
-            <a:off x="6852184" y="633233"/>
-            <a:ext cx="834017" cy="834017"/>
+            <a:off x="2041651" y="3432894"/>
+            <a:ext cx="248314" cy="248314"/>
           </a:xfrm>
           <a:prstGeom prst="rect">
             <a:avLst/>
@@ -13354,14 +13388,14 @@
       </p:pic>
       <p:sp>
         <p:nvSpPr>
-          <p:cNvPr id="77" name="文字方塊 76"/>
+          <p:cNvPr id="34" name="文字方塊 33"/>
           <p:cNvSpPr txBox="1"/>
           <p:nvPr/>
         </p:nvSpPr>
         <p:spPr>
           <a:xfrm>
-            <a:off x="7658658" y="727075"/>
-            <a:ext cx="1422249" cy="646331"/>
+            <a:off x="2279637" y="3386651"/>
+            <a:ext cx="957313" cy="307777"/>
           </a:xfrm>
           <a:prstGeom prst="rect">
             <a:avLst/>
@@ -13375,22 +13409,13 @@
           <a:lstStyle/>
           <a:p>
             <a:r>
-              <a:rPr lang="en-US" altLang="zh-TW" dirty="0" smtClean="0">
-                <a:latin typeface="Times New Roman" panose="02020603050405020304" pitchFamily="18" charset="0"/>
-                <a:cs typeface="Times New Roman" panose="02020603050405020304" pitchFamily="18" charset="0"/>
-              </a:rPr>
-              <a:t>Run Airplane</a:t>
-            </a:r>
-          </a:p>
-          <a:p>
-            <a:r>
-              <a:rPr lang="en-US" altLang="zh-TW" dirty="0" smtClean="0">
-                <a:latin typeface="Times New Roman" panose="02020603050405020304" pitchFamily="18" charset="0"/>
-                <a:cs typeface="Times New Roman" panose="02020603050405020304" pitchFamily="18" charset="0"/>
-              </a:rPr>
-              <a:t>ON / OFF</a:t>
-            </a:r>
-            <a:endParaRPr lang="zh-TW" altLang="en-US" dirty="0">
+              <a:rPr lang="en-US" altLang="zh-TW" sz="1400" dirty="0" smtClean="0">
+                <a:latin typeface="Times New Roman" panose="02020603050405020304" pitchFamily="18" charset="0"/>
+                <a:cs typeface="Times New Roman" panose="02020603050405020304" pitchFamily="18" charset="0"/>
+              </a:rPr>
+              <a:t>Run Script</a:t>
+            </a:r>
+            <a:endParaRPr lang="zh-TW" altLang="en-US" sz="1400" dirty="0">
               <a:latin typeface="Times New Roman" panose="02020603050405020304" pitchFamily="18" charset="0"/>
               <a:cs typeface="Times New Roman" panose="02020603050405020304" pitchFamily="18" charset="0"/>
             </a:endParaRPr>
@@ -13399,387 +13424,7 @@
       </p:sp>
       <p:pic>
         <p:nvPicPr>
-          <p:cNvPr id="78" name="Picture 9" descr="D:\Users\ZL.chen\Desktop\download.png"/>
-          <p:cNvPicPr>
-            <a:picLocks noChangeAspect="1" noChangeArrowheads="1"/>
-          </p:cNvPicPr>
-          <p:nvPr/>
-        </p:nvPicPr>
-        <p:blipFill>
-          <a:blip r:embed="rId5" cstate="print">
-            <a:extLst>
-              <a:ext uri="{BEBA8EAE-BF5A-486C-A8C5-ECC9F3942E4B}">
-                <a14:imgProps xmlns:a14="http://schemas.microsoft.com/office/drawing/2010/main">
-                  <a14:imgLayer r:embed="rId6">
-                    <a14:imgEffect>
-                      <a14:backgroundRemoval t="8000" b="93333" l="4889" r="94667">
-                        <a14:backgroundMark x1="11556" y1="84444" x2="11556" y2="84444"/>
-                        <a14:backgroundMark x1="9333" y1="63111" x2="9333" y2="63111"/>
-                        <a14:backgroundMark x1="13333" y1="18667" x2="13333" y2="18667"/>
-                        <a14:backgroundMark x1="82667" y1="14222" x2="82667" y2="14222"/>
-                        <a14:backgroundMark x1="88444" y1="82667" x2="88444" y2="82667"/>
-                      </a14:backgroundRemoval>
-                    </a14:imgEffect>
-                  </a14:imgLayer>
-                </a14:imgProps>
-              </a:ext>
-              <a:ext uri="{28A0092B-C50C-407E-A947-70E740481C1C}">
-                <a14:useLocalDpi xmlns:a14="http://schemas.microsoft.com/office/drawing/2010/main" val="0"/>
-              </a:ext>
-            </a:extLst>
-          </a:blip>
-          <a:srcRect/>
-          <a:stretch>
-            <a:fillRect/>
-          </a:stretch>
-        </p:blipFill>
-        <p:spPr bwMode="auto">
-          <a:xfrm rot="1856530">
-            <a:off x="6852185" y="2255677"/>
-            <a:ext cx="834017" cy="834017"/>
-          </a:xfrm>
-          <a:prstGeom prst="rect">
-            <a:avLst/>
-          </a:prstGeom>
-          <a:noFill/>
-          <a:extLst>
-            <a:ext uri="{909E8E84-426E-40DD-AFC4-6F175D3DCCD1}">
-              <a14:hiddenFill xmlns:a14="http://schemas.microsoft.com/office/drawing/2010/main">
-                <a:solidFill>
-                  <a:srgbClr val="FFFFFF"/>
-                </a:solidFill>
-              </a14:hiddenFill>
-            </a:ext>
-          </a:extLst>
-        </p:spPr>
-      </p:pic>
-      <p:sp>
-        <p:nvSpPr>
-          <p:cNvPr id="79" name="文字方塊 78"/>
-          <p:cNvSpPr txBox="1"/>
-          <p:nvPr/>
-        </p:nvSpPr>
-        <p:spPr>
-          <a:xfrm>
-            <a:off x="7658658" y="2349519"/>
-            <a:ext cx="1422249" cy="646331"/>
-          </a:xfrm>
-          <a:prstGeom prst="rect">
-            <a:avLst/>
-          </a:prstGeom>
-          <a:noFill/>
-        </p:spPr>
-        <p:txBody>
-          <a:bodyPr wrap="none" rtlCol="0">
-            <a:spAutoFit/>
-          </a:bodyPr>
-          <a:lstStyle/>
-          <a:p>
-            <a:r>
-              <a:rPr lang="en-US" altLang="zh-TW" dirty="0" smtClean="0">
-                <a:latin typeface="Times New Roman" panose="02020603050405020304" pitchFamily="18" charset="0"/>
-                <a:cs typeface="Times New Roman" panose="02020603050405020304" pitchFamily="18" charset="0"/>
-              </a:rPr>
-              <a:t>Run Airplane</a:t>
-            </a:r>
-          </a:p>
-          <a:p>
-            <a:r>
-              <a:rPr lang="en-US" altLang="zh-TW" dirty="0" smtClean="0">
-                <a:latin typeface="Times New Roman" panose="02020603050405020304" pitchFamily="18" charset="0"/>
-                <a:cs typeface="Times New Roman" panose="02020603050405020304" pitchFamily="18" charset="0"/>
-              </a:rPr>
-              <a:t>ON / OFF</a:t>
-            </a:r>
-            <a:endParaRPr lang="zh-TW" altLang="en-US" dirty="0">
-              <a:latin typeface="Times New Roman" panose="02020603050405020304" pitchFamily="18" charset="0"/>
-              <a:cs typeface="Times New Roman" panose="02020603050405020304" pitchFamily="18" charset="0"/>
-            </a:endParaRPr>
-          </a:p>
-        </p:txBody>
-      </p:sp>
-      <p:pic>
-        <p:nvPicPr>
-          <p:cNvPr id="82" name="Picture 9" descr="D:\Users\ZL.chen\Desktop\download.png"/>
-          <p:cNvPicPr>
-            <a:picLocks noChangeAspect="1" noChangeArrowheads="1"/>
-          </p:cNvPicPr>
-          <p:nvPr/>
-        </p:nvPicPr>
-        <p:blipFill>
-          <a:blip r:embed="rId5" cstate="print">
-            <a:extLst>
-              <a:ext uri="{BEBA8EAE-BF5A-486C-A8C5-ECC9F3942E4B}">
-                <a14:imgProps xmlns:a14="http://schemas.microsoft.com/office/drawing/2010/main">
-                  <a14:imgLayer r:embed="rId6">
-                    <a14:imgEffect>
-                      <a14:backgroundRemoval t="8000" b="93333" l="4889" r="94667">
-                        <a14:backgroundMark x1="11556" y1="84444" x2="11556" y2="84444"/>
-                        <a14:backgroundMark x1="9333" y1="63111" x2="9333" y2="63111"/>
-                        <a14:backgroundMark x1="13333" y1="18667" x2="13333" y2="18667"/>
-                        <a14:backgroundMark x1="82667" y1="14222" x2="82667" y2="14222"/>
-                        <a14:backgroundMark x1="88444" y1="82667" x2="88444" y2="82667"/>
-                      </a14:backgroundRemoval>
-                    </a14:imgEffect>
-                  </a14:imgLayer>
-                </a14:imgProps>
-              </a:ext>
-              <a:ext uri="{28A0092B-C50C-407E-A947-70E740481C1C}">
-                <a14:useLocalDpi xmlns:a14="http://schemas.microsoft.com/office/drawing/2010/main" val="0"/>
-              </a:ext>
-            </a:extLst>
-          </a:blip>
-          <a:srcRect/>
-          <a:stretch>
-            <a:fillRect/>
-          </a:stretch>
-        </p:blipFill>
-        <p:spPr bwMode="auto">
-          <a:xfrm rot="1856530">
-            <a:off x="6852183" y="3761482"/>
-            <a:ext cx="834017" cy="834017"/>
-          </a:xfrm>
-          <a:prstGeom prst="rect">
-            <a:avLst/>
-          </a:prstGeom>
-          <a:noFill/>
-          <a:extLst>
-            <a:ext uri="{909E8E84-426E-40DD-AFC4-6F175D3DCCD1}">
-              <a14:hiddenFill xmlns:a14="http://schemas.microsoft.com/office/drawing/2010/main">
-                <a:solidFill>
-                  <a:srgbClr val="FFFFFF"/>
-                </a:solidFill>
-              </a14:hiddenFill>
-            </a:ext>
-          </a:extLst>
-        </p:spPr>
-      </p:pic>
-      <p:sp>
-        <p:nvSpPr>
-          <p:cNvPr id="83" name="文字方塊 82"/>
-          <p:cNvSpPr txBox="1"/>
-          <p:nvPr/>
-        </p:nvSpPr>
-        <p:spPr>
-          <a:xfrm>
-            <a:off x="7658658" y="3855324"/>
-            <a:ext cx="1422249" cy="646331"/>
-          </a:xfrm>
-          <a:prstGeom prst="rect">
-            <a:avLst/>
-          </a:prstGeom>
-          <a:noFill/>
-        </p:spPr>
-        <p:txBody>
-          <a:bodyPr wrap="none" rtlCol="0">
-            <a:spAutoFit/>
-          </a:bodyPr>
-          <a:lstStyle/>
-          <a:p>
-            <a:r>
-              <a:rPr lang="en-US" altLang="zh-TW" dirty="0" smtClean="0">
-                <a:latin typeface="Times New Roman" panose="02020603050405020304" pitchFamily="18" charset="0"/>
-                <a:cs typeface="Times New Roman" panose="02020603050405020304" pitchFamily="18" charset="0"/>
-              </a:rPr>
-              <a:t>Run Airplane</a:t>
-            </a:r>
-          </a:p>
-          <a:p>
-            <a:r>
-              <a:rPr lang="en-US" altLang="zh-TW" dirty="0" smtClean="0">
-                <a:latin typeface="Times New Roman" panose="02020603050405020304" pitchFamily="18" charset="0"/>
-                <a:cs typeface="Times New Roman" panose="02020603050405020304" pitchFamily="18" charset="0"/>
-              </a:rPr>
-              <a:t>ON / OFF</a:t>
-            </a:r>
-            <a:endParaRPr lang="zh-TW" altLang="en-US" dirty="0">
-              <a:latin typeface="Times New Roman" panose="02020603050405020304" pitchFamily="18" charset="0"/>
-              <a:cs typeface="Times New Roman" panose="02020603050405020304" pitchFamily="18" charset="0"/>
-            </a:endParaRPr>
-          </a:p>
-        </p:txBody>
-      </p:sp>
-      <p:pic>
-        <p:nvPicPr>
-          <p:cNvPr id="84" name="Picture 9" descr="D:\Users\ZL.chen\Desktop\download.png"/>
-          <p:cNvPicPr>
-            <a:picLocks noChangeAspect="1" noChangeArrowheads="1"/>
-          </p:cNvPicPr>
-          <p:nvPr/>
-        </p:nvPicPr>
-        <p:blipFill>
-          <a:blip r:embed="rId5" cstate="print">
-            <a:extLst>
-              <a:ext uri="{BEBA8EAE-BF5A-486C-A8C5-ECC9F3942E4B}">
-                <a14:imgProps xmlns:a14="http://schemas.microsoft.com/office/drawing/2010/main">
-                  <a14:imgLayer r:embed="rId6">
-                    <a14:imgEffect>
-                      <a14:backgroundRemoval t="8000" b="93333" l="4889" r="94667">
-                        <a14:backgroundMark x1="11556" y1="84444" x2="11556" y2="84444"/>
-                        <a14:backgroundMark x1="9333" y1="63111" x2="9333" y2="63111"/>
-                        <a14:backgroundMark x1="13333" y1="18667" x2="13333" y2="18667"/>
-                        <a14:backgroundMark x1="82667" y1="14222" x2="82667" y2="14222"/>
-                        <a14:backgroundMark x1="88444" y1="82667" x2="88444" y2="82667"/>
-                      </a14:backgroundRemoval>
-                    </a14:imgEffect>
-                  </a14:imgLayer>
-                </a14:imgProps>
-              </a:ext>
-              <a:ext uri="{28A0092B-C50C-407E-A947-70E740481C1C}">
-                <a14:useLocalDpi xmlns:a14="http://schemas.microsoft.com/office/drawing/2010/main" val="0"/>
-              </a:ext>
-            </a:extLst>
-          </a:blip>
-          <a:srcRect/>
-          <a:stretch>
-            <a:fillRect/>
-          </a:stretch>
-        </p:blipFill>
-        <p:spPr bwMode="auto">
-          <a:xfrm rot="1856530">
-            <a:off x="3539389" y="493555"/>
-            <a:ext cx="834017" cy="834017"/>
-          </a:xfrm>
-          <a:prstGeom prst="rect">
-            <a:avLst/>
-          </a:prstGeom>
-          <a:noFill/>
-          <a:extLst>
-            <a:ext uri="{909E8E84-426E-40DD-AFC4-6F175D3DCCD1}">
-              <a14:hiddenFill xmlns:a14="http://schemas.microsoft.com/office/drawing/2010/main">
-                <a:solidFill>
-                  <a:srgbClr val="FFFFFF"/>
-                </a:solidFill>
-              </a14:hiddenFill>
-            </a:ext>
-          </a:extLst>
-        </p:spPr>
-      </p:pic>
-      <p:sp>
-        <p:nvSpPr>
-          <p:cNvPr id="85" name="文字方塊 84"/>
-          <p:cNvSpPr txBox="1"/>
-          <p:nvPr/>
-        </p:nvSpPr>
-        <p:spPr>
-          <a:xfrm>
-            <a:off x="3395795" y="1247784"/>
-            <a:ext cx="1178528" cy="369332"/>
-          </a:xfrm>
-          <a:prstGeom prst="rect">
-            <a:avLst/>
-          </a:prstGeom>
-          <a:noFill/>
-        </p:spPr>
-        <p:txBody>
-          <a:bodyPr wrap="none" rtlCol="0">
-            <a:spAutoFit/>
-          </a:bodyPr>
-          <a:lstStyle/>
-          <a:p>
-            <a:r>
-              <a:rPr lang="en-US" altLang="zh-TW" dirty="0" smtClean="0">
-                <a:latin typeface="Times New Roman" panose="02020603050405020304" pitchFamily="18" charset="0"/>
-                <a:cs typeface="Times New Roman" panose="02020603050405020304" pitchFamily="18" charset="0"/>
-              </a:rPr>
-              <a:t>Run Script</a:t>
-            </a:r>
-            <a:endParaRPr lang="zh-TW" altLang="en-US" dirty="0">
-              <a:latin typeface="Times New Roman" panose="02020603050405020304" pitchFamily="18" charset="0"/>
-              <a:cs typeface="Times New Roman" panose="02020603050405020304" pitchFamily="18" charset="0"/>
-            </a:endParaRPr>
-          </a:p>
-        </p:txBody>
-      </p:sp>
-      <p:pic>
-        <p:nvPicPr>
-          <p:cNvPr id="86" name="Picture 3" descr="D:\Users\ZL.chen\Desktop\P_setting_fff_1_nd_500.jpg"/>
-          <p:cNvPicPr>
-            <a:picLocks noChangeAspect="1" noChangeArrowheads="1"/>
-          </p:cNvPicPr>
-          <p:nvPr/>
-        </p:nvPicPr>
-        <p:blipFill>
-          <a:blip r:embed="rId7" cstate="print">
-            <a:extLst>
-              <a:ext uri="{BEBA8EAE-BF5A-486C-A8C5-ECC9F3942E4B}">
-                <a14:imgProps xmlns:a14="http://schemas.microsoft.com/office/drawing/2010/main">
-                  <a14:imgLayer r:embed="rId8">
-                    <a14:imgEffect>
-                      <a14:backgroundRemoval t="10000" b="90000" l="10000" r="90000"/>
-                    </a14:imgEffect>
-                  </a14:imgLayer>
-                </a14:imgProps>
-              </a:ext>
-              <a:ext uri="{28A0092B-C50C-407E-A947-70E740481C1C}">
-                <a14:useLocalDpi xmlns:a14="http://schemas.microsoft.com/office/drawing/2010/main" val="0"/>
-              </a:ext>
-            </a:extLst>
-          </a:blip>
-          <a:srcRect/>
-          <a:stretch>
-            <a:fillRect/>
-          </a:stretch>
-        </p:blipFill>
-        <p:spPr bwMode="auto">
-          <a:xfrm>
-            <a:off x="716764" y="496634"/>
-            <a:ext cx="1072558" cy="1072558"/>
-          </a:xfrm>
-          <a:prstGeom prst="rect">
-            <a:avLst/>
-          </a:prstGeom>
-          <a:noFill/>
-          <a:extLst>
-            <a:ext uri="{909E8E84-426E-40DD-AFC4-6F175D3DCCD1}">
-              <a14:hiddenFill xmlns:a14="http://schemas.microsoft.com/office/drawing/2010/main">
-                <a:solidFill>
-                  <a:srgbClr val="FFFFFF"/>
-                </a:solidFill>
-              </a14:hiddenFill>
-            </a:ext>
-          </a:extLst>
-        </p:spPr>
-      </p:pic>
-      <p:sp>
-        <p:nvSpPr>
-          <p:cNvPr id="87" name="文字方塊 86"/>
-          <p:cNvSpPr txBox="1"/>
-          <p:nvPr/>
-        </p:nvSpPr>
-        <p:spPr>
-          <a:xfrm>
-            <a:off x="1013594" y="181001"/>
-            <a:ext cx="479618" cy="369332"/>
-          </a:xfrm>
-          <a:prstGeom prst="rect">
-            <a:avLst/>
-          </a:prstGeom>
-          <a:noFill/>
-        </p:spPr>
-        <p:txBody>
-          <a:bodyPr wrap="none" rtlCol="0">
-            <a:spAutoFit/>
-          </a:bodyPr>
-          <a:lstStyle/>
-          <a:p>
-            <a:r>
-              <a:rPr lang="en-US" altLang="zh-TW" dirty="0" smtClean="0">
-                <a:latin typeface="Times New Roman" panose="02020603050405020304" pitchFamily="18" charset="0"/>
-                <a:cs typeface="Times New Roman" panose="02020603050405020304" pitchFamily="18" charset="0"/>
-              </a:rPr>
-              <a:t>AP</a:t>
-            </a:r>
-            <a:endParaRPr lang="zh-TW" altLang="en-US" dirty="0">
-              <a:latin typeface="Times New Roman" panose="02020603050405020304" pitchFamily="18" charset="0"/>
-              <a:cs typeface="Times New Roman" panose="02020603050405020304" pitchFamily="18" charset="0"/>
-            </a:endParaRPr>
-          </a:p>
-        </p:txBody>
-      </p:sp>
-      <p:pic>
-        <p:nvPicPr>
-          <p:cNvPr id="13" name="圖片 12"/>
+          <p:cNvPr id="11" name="圖片 10"/>
           <p:cNvPicPr>
             <a:picLocks noChangeAspect="1"/>
           </p:cNvPicPr>
@@ -13798,9 +13443,9 @@
           </a:stretch>
         </p:blipFill>
         <p:spPr>
-          <a:xfrm rot="4102625" flipH="1">
-            <a:off x="1838483" y="880977"/>
-            <a:ext cx="303871" cy="303871"/>
+          <a:xfrm>
+            <a:off x="4474881" y="2263329"/>
+            <a:ext cx="658747" cy="1090341"/>
           </a:xfrm>
           <a:prstGeom prst="rect">
             <a:avLst/>
@@ -13809,7 +13454,7 @@
       </p:pic>
       <p:pic>
         <p:nvPicPr>
-          <p:cNvPr id="90" name="圖片 89"/>
+          <p:cNvPr id="41" name="圖片 40"/>
           <p:cNvPicPr>
             <a:picLocks noChangeAspect="1"/>
           </p:cNvPicPr>
@@ -13828,9 +13473,9 @@
           </a:stretch>
         </p:blipFill>
         <p:spPr>
-          <a:xfrm rot="11306932" flipH="1">
-            <a:off x="1026999" y="1630522"/>
-            <a:ext cx="303871" cy="303871"/>
+          <a:xfrm>
+            <a:off x="4480235" y="3455461"/>
+            <a:ext cx="658747" cy="1090341"/>
           </a:xfrm>
           <a:prstGeom prst="rect">
             <a:avLst/>
@@ -13839,14 +13484,14 @@
       </p:pic>
       <p:pic>
         <p:nvPicPr>
-          <p:cNvPr id="92" name="圖片 91"/>
+          <p:cNvPr id="16" name="圖片 15"/>
           <p:cNvPicPr>
             <a:picLocks noChangeAspect="1"/>
           </p:cNvPicPr>
           <p:nvPr/>
         </p:nvPicPr>
         <p:blipFill>
-          <a:blip r:embed="rId9" cstate="print">
+          <a:blip r:embed="rId10" cstate="print">
             <a:extLst>
               <a:ext uri="{28A0092B-C50C-407E-A947-70E740481C1C}">
                 <a14:useLocalDpi xmlns:a14="http://schemas.microsoft.com/office/drawing/2010/main" val="0"/>
@@ -13858,9 +13503,69 @@
           </a:stretch>
         </p:blipFill>
         <p:spPr>
-          <a:xfrm rot="18245489" flipH="1">
-            <a:off x="370676" y="758627"/>
-            <a:ext cx="303871" cy="303871"/>
+          <a:xfrm>
+            <a:off x="1200478" y="1416181"/>
+            <a:ext cx="759873" cy="401551"/>
+          </a:xfrm>
+          <a:prstGeom prst="rect">
+            <a:avLst/>
+          </a:prstGeom>
+        </p:spPr>
+      </p:pic>
+      <p:pic>
+        <p:nvPicPr>
+          <p:cNvPr id="44" name="圖片 43"/>
+          <p:cNvPicPr>
+            <a:picLocks noChangeAspect="1"/>
+          </p:cNvPicPr>
+          <p:nvPr/>
+        </p:nvPicPr>
+        <p:blipFill>
+          <a:blip r:embed="rId10" cstate="print">
+            <a:extLst>
+              <a:ext uri="{28A0092B-C50C-407E-A947-70E740481C1C}">
+                <a14:useLocalDpi xmlns:a14="http://schemas.microsoft.com/office/drawing/2010/main" val="0"/>
+              </a:ext>
+            </a:extLst>
+          </a:blip>
+          <a:stretch>
+            <a:fillRect/>
+          </a:stretch>
+        </p:blipFill>
+        <p:spPr>
+          <a:xfrm>
+            <a:off x="1200478" y="2511396"/>
+            <a:ext cx="759873" cy="401551"/>
+          </a:xfrm>
+          <a:prstGeom prst="rect">
+            <a:avLst/>
+          </a:prstGeom>
+        </p:spPr>
+      </p:pic>
+      <p:pic>
+        <p:nvPicPr>
+          <p:cNvPr id="45" name="圖片 44"/>
+          <p:cNvPicPr>
+            <a:picLocks noChangeAspect="1"/>
+          </p:cNvPicPr>
+          <p:nvPr/>
+        </p:nvPicPr>
+        <p:blipFill>
+          <a:blip r:embed="rId10" cstate="print">
+            <a:extLst>
+              <a:ext uri="{28A0092B-C50C-407E-A947-70E740481C1C}">
+                <a14:useLocalDpi xmlns:a14="http://schemas.microsoft.com/office/drawing/2010/main" val="0"/>
+              </a:ext>
+            </a:extLst>
+          </a:blip>
+          <a:stretch>
+            <a:fillRect/>
+          </a:stretch>
+        </p:blipFill>
+        <p:spPr>
+          <a:xfrm>
+            <a:off x="1192651" y="3695179"/>
+            <a:ext cx="759873" cy="401551"/>
           </a:xfrm>
           <a:prstGeom prst="rect">
             <a:avLst/>
@@ -13870,7 +13575,7 @@
     </p:spTree>
     <p:extLst>
       <p:ext uri="{BB962C8B-B14F-4D97-AF65-F5344CB8AC3E}">
-        <p14:creationId xmlns:p14="http://schemas.microsoft.com/office/powerpoint/2010/main" val="3887830258"/>
+        <p14:creationId xmlns:p14="http://schemas.microsoft.com/office/powerpoint/2010/main" val="380588698"/>
       </p:ext>
     </p:extLst>
   </p:cSld>
@@ -15030,7 +14735,7 @@
           <a:prstGeom prst="straightConnector1">
             <a:avLst/>
           </a:prstGeom>
-          <a:ln>
+          <a:ln w="19050">
             <a:headEnd type="arrow"/>
             <a:tailEnd type="arrow"/>
           </a:ln>
@@ -15251,7 +14956,7 @@
           <a:prstGeom prst="straightConnector1">
             <a:avLst/>
           </a:prstGeom>
-          <a:ln>
+          <a:ln w="19050">
             <a:tailEnd type="arrow"/>
           </a:ln>
         </p:spPr>
@@ -15386,6 +15091,36 @@
           </a:p>
         </p:txBody>
       </p:sp>
+      <p:pic>
+        <p:nvPicPr>
+          <p:cNvPr id="2" name="圖片 1"/>
+          <p:cNvPicPr>
+            <a:picLocks noChangeAspect="1"/>
+          </p:cNvPicPr>
+          <p:nvPr/>
+        </p:nvPicPr>
+        <p:blipFill>
+          <a:blip r:embed="rId8" cstate="print">
+            <a:extLst>
+              <a:ext uri="{28A0092B-C50C-407E-A947-70E740481C1C}">
+                <a14:useLocalDpi xmlns:a14="http://schemas.microsoft.com/office/drawing/2010/main" val="0"/>
+              </a:ext>
+            </a:extLst>
+          </a:blip>
+          <a:stretch>
+            <a:fillRect/>
+          </a:stretch>
+        </p:blipFill>
+        <p:spPr>
+          <a:xfrm>
+            <a:off x="1629426" y="1967373"/>
+            <a:ext cx="760028" cy="402058"/>
+          </a:xfrm>
+          <a:prstGeom prst="rect">
+            <a:avLst/>
+          </a:prstGeom>
+        </p:spPr>
+      </p:pic>
     </p:spTree>
     <p:extLst>
       <p:ext uri="{BB962C8B-B14F-4D97-AF65-F5344CB8AC3E}">
@@ -16334,47 +16069,197 @@
           </a:p>
         </p:txBody>
       </p:sp>
+      <p:cxnSp>
+        <p:nvCxnSpPr>
+          <p:cNvPr id="8" name="直線單箭頭接點 7"/>
+          <p:cNvCxnSpPr/>
+          <p:nvPr/>
+        </p:nvCxnSpPr>
+        <p:spPr>
+          <a:xfrm flipV="1">
+            <a:off x="4503764" y="3172295"/>
+            <a:ext cx="678872" cy="1"/>
+          </a:xfrm>
+          <a:prstGeom prst="straightConnector1">
+            <a:avLst/>
+          </a:prstGeom>
+          <a:ln w="19050" cap="flat" cmpd="sng" algn="ctr">
+            <a:solidFill>
+              <a:schemeClr val="accent1"/>
+            </a:solidFill>
+            <a:prstDash val="solid"/>
+            <a:round/>
+            <a:headEnd type="none" w="med" len="med"/>
+            <a:tailEnd type="arrow" w="med" len="med"/>
+          </a:ln>
+        </p:spPr>
+        <p:style>
+          <a:lnRef idx="0">
+            <a:scrgbClr r="0" g="0" b="0"/>
+          </a:lnRef>
+          <a:fillRef idx="0">
+            <a:scrgbClr r="0" g="0" b="0"/>
+          </a:fillRef>
+          <a:effectRef idx="0">
+            <a:scrgbClr r="0" g="0" b="0"/>
+          </a:effectRef>
+          <a:fontRef idx="minor">
+            <a:schemeClr val="tx1"/>
+          </a:fontRef>
+        </p:style>
+      </p:cxnSp>
       <p:pic>
         <p:nvPicPr>
-          <p:cNvPr id="4" name="圖片 3"/>
-          <p:cNvPicPr/>
+          <p:cNvPr id="32" name="圖片 31"/>
+          <p:cNvPicPr>
+            <a:picLocks noChangeAspect="1"/>
+          </p:cNvPicPr>
           <p:nvPr/>
         </p:nvPicPr>
-        <p:blipFill rotWithShape="1">
-          <a:blip r:embed="rId3">
+        <p:blipFill>
+          <a:blip r:embed="rId3"/>
+          <a:stretch>
+            <a:fillRect/>
+          </a:stretch>
+        </p:blipFill>
+        <p:spPr>
+          <a:xfrm>
+            <a:off x="5186262" y="2378241"/>
+            <a:ext cx="3563164" cy="1588107"/>
+          </a:xfrm>
+          <a:prstGeom prst="rect">
+            <a:avLst/>
+          </a:prstGeom>
+        </p:spPr>
+      </p:pic>
+      <p:pic>
+        <p:nvPicPr>
+          <p:cNvPr id="33" name="圖片 32"/>
+          <p:cNvPicPr>
+            <a:picLocks noChangeAspect="1"/>
+          </p:cNvPicPr>
+          <p:nvPr/>
+        </p:nvPicPr>
+        <p:blipFill>
+          <a:blip r:embed="rId4">
             <a:extLst>
               <a:ext uri="{28A0092B-C50C-407E-A947-70E740481C1C}">
                 <a14:useLocalDpi xmlns:a14="http://schemas.microsoft.com/office/drawing/2010/main" val="0"/>
               </a:ext>
             </a:extLst>
           </a:blip>
-          <a:srcRect l="196" r="13294"/>
-          <a:stretch/>
+          <a:stretch>
+            <a:fillRect/>
+          </a:stretch>
         </p:blipFill>
-        <p:spPr bwMode="auto">
+        <p:spPr>
           <a:xfrm>
-            <a:off x="975156" y="1586451"/>
-            <a:ext cx="7281740" cy="2780833"/>
+            <a:off x="593680" y="1813393"/>
+            <a:ext cx="4065617" cy="2743004"/>
+          </a:xfrm>
+          <a:prstGeom prst="rect">
+            <a:avLst/>
+          </a:prstGeom>
+        </p:spPr>
+      </p:pic>
+      <p:sp>
+        <p:nvSpPr>
+          <p:cNvPr id="15" name="矩形 14"/>
+          <p:cNvSpPr/>
+          <p:nvPr/>
+        </p:nvSpPr>
+        <p:spPr>
+          <a:xfrm>
+            <a:off x="1860563" y="3090408"/>
+            <a:ext cx="2131410" cy="205526"/>
           </a:xfrm>
           <a:prstGeom prst="rect">
             <a:avLst/>
           </a:prstGeom>
           <a:noFill/>
           <a:ln>
-            <a:noFill/>
+            <a:solidFill>
+              <a:srgbClr val="00B050"/>
+            </a:solidFill>
           </a:ln>
         </p:spPr>
-      </p:pic>
-      <p:sp>
-        <p:nvSpPr>
-          <p:cNvPr id="5" name="矩形 4"/>
+        <p:style>
+          <a:lnRef idx="2">
+            <a:schemeClr val="dk1"/>
+          </a:lnRef>
+          <a:fillRef idx="1">
+            <a:schemeClr val="lt1"/>
+          </a:fillRef>
+          <a:effectRef idx="0">
+            <a:schemeClr val="dk1"/>
+          </a:effectRef>
+          <a:fontRef idx="minor">
+            <a:schemeClr val="dk1"/>
+          </a:fontRef>
+        </p:style>
+        <p:txBody>
+          <a:bodyPr rtlCol="0" anchor="ctr"/>
+          <a:lstStyle/>
+          <a:p>
+            <a:pPr algn="ctr"/>
+            <a:endParaRPr lang="zh-TW" altLang="en-US"/>
+          </a:p>
+        </p:txBody>
+      </p:sp>
+      <p:sp>
+        <p:nvSpPr>
+          <p:cNvPr id="16" name="矩形 15"/>
           <p:cNvSpPr/>
           <p:nvPr/>
         </p:nvSpPr>
         <p:spPr>
           <a:xfrm>
-            <a:off x="975156" y="2393984"/>
-            <a:ext cx="7281740" cy="1679873"/>
+            <a:off x="1867387" y="2485058"/>
+            <a:ext cx="2124586" cy="414629"/>
+          </a:xfrm>
+          <a:prstGeom prst="rect">
+            <a:avLst/>
+          </a:prstGeom>
+          <a:noFill/>
+          <a:ln>
+            <a:solidFill>
+              <a:srgbClr val="00B050"/>
+            </a:solidFill>
+          </a:ln>
+        </p:spPr>
+        <p:style>
+          <a:lnRef idx="2">
+            <a:schemeClr val="dk1"/>
+          </a:lnRef>
+          <a:fillRef idx="1">
+            <a:schemeClr val="lt1"/>
+          </a:fillRef>
+          <a:effectRef idx="0">
+            <a:schemeClr val="dk1"/>
+          </a:effectRef>
+          <a:fontRef idx="minor">
+            <a:schemeClr val="dk1"/>
+          </a:fontRef>
+        </p:style>
+        <p:txBody>
+          <a:bodyPr rtlCol="0" anchor="ctr"/>
+          <a:lstStyle/>
+          <a:p>
+            <a:pPr algn="ctr"/>
+            <a:endParaRPr lang="zh-TW" altLang="en-US"/>
+          </a:p>
+        </p:txBody>
+      </p:sp>
+      <p:sp>
+        <p:nvSpPr>
+          <p:cNvPr id="25" name="矩形 24"/>
+          <p:cNvSpPr/>
+          <p:nvPr/>
+        </p:nvSpPr>
+        <p:spPr>
+          <a:xfrm>
+            <a:off x="5182636" y="2892052"/>
+            <a:ext cx="3415456" cy="792843"/>
           </a:xfrm>
           <a:prstGeom prst="rect">
             <a:avLst/>
@@ -16480,12 +16365,20 @@
               <a:defRPr/>
             </a:pPr>
             <a:r>
+              <a:rPr lang="zh-TW" altLang="en-US" sz="2000" dirty="0" smtClean="0">
+                <a:latin typeface="標楷體" panose="03000509000000000000" pitchFamily="65" charset="-120"/>
+                <a:ea typeface="標楷體" panose="03000509000000000000" pitchFamily="65" charset="-120"/>
+                <a:cs typeface="Times New Roman" panose="02020603050405020304" pitchFamily="18" charset="0"/>
+              </a:rPr>
+              <a:t>根據規格產</a:t>
+            </a:r>
+            <a:r>
               <a:rPr lang="zh-TW" altLang="en-US" sz="2000" dirty="0">
                 <a:latin typeface="標楷體" panose="03000509000000000000" pitchFamily="65" charset="-120"/>
                 <a:ea typeface="標楷體" panose="03000509000000000000" pitchFamily="65" charset="-120"/>
                 <a:cs typeface="Times New Roman" panose="02020603050405020304" pitchFamily="18" charset="0"/>
               </a:rPr>
-              <a:t>產圖示意圖如下：</a:t>
+              <a:t>圖示意圖如下：</a:t>
             </a:r>
             <a:endParaRPr lang="en-US" altLang="zh-TW" sz="2000" dirty="0">
               <a:latin typeface="標楷體" panose="03000509000000000000" pitchFamily="65" charset="-120"/>
@@ -16570,131 +16463,33 @@
       </p:sp>
       <p:pic>
         <p:nvPicPr>
-          <p:cNvPr id="8" name="圖片 7"/>
-          <p:cNvPicPr/>
+          <p:cNvPr id="14" name="圖片 13"/>
+          <p:cNvPicPr>
+            <a:picLocks noChangeAspect="1"/>
+          </p:cNvPicPr>
           <p:nvPr/>
         </p:nvPicPr>
-        <p:blipFill rotWithShape="1">
-          <a:blip r:embed="rId3">
-            <a:extLst>
-              <a:ext uri="{28A0092B-C50C-407E-A947-70E740481C1C}">
-                <a14:useLocalDpi xmlns:a14="http://schemas.microsoft.com/office/drawing/2010/main" val="0"/>
-              </a:ext>
-            </a:extLst>
-          </a:blip>
-          <a:srcRect t="8633" r="78588"/>
-          <a:stretch/>
+        <p:blipFill>
+          <a:blip r:embed="rId3"/>
+          <a:stretch>
+            <a:fillRect/>
+          </a:stretch>
         </p:blipFill>
-        <p:spPr bwMode="auto">
+        <p:spPr>
           <a:xfrm>
-            <a:off x="6295002" y="1632521"/>
-            <a:ext cx="1968718" cy="2931921"/>
+            <a:off x="1482302" y="1972408"/>
+            <a:ext cx="2599899" cy="1926544"/>
           </a:xfrm>
           <a:prstGeom prst="rect">
             <a:avLst/>
           </a:prstGeom>
-          <a:noFill/>
-          <a:ln>
-            <a:noFill/>
-          </a:ln>
         </p:spPr>
       </p:pic>
-      <p:sp>
-        <p:nvSpPr>
-          <p:cNvPr id="9" name="矩形 8"/>
-          <p:cNvSpPr/>
-          <p:nvPr/>
-        </p:nvSpPr>
-        <p:spPr>
-          <a:xfrm>
-            <a:off x="6394500" y="1647635"/>
-            <a:ext cx="1869220" cy="294519"/>
-          </a:xfrm>
-          <a:prstGeom prst="rect">
-            <a:avLst/>
-          </a:prstGeom>
-          <a:noFill/>
-          <a:ln>
-            <a:solidFill>
-              <a:srgbClr val="00B050"/>
-            </a:solidFill>
-          </a:ln>
-        </p:spPr>
-        <p:style>
-          <a:lnRef idx="2">
-            <a:schemeClr val="dk1"/>
-          </a:lnRef>
-          <a:fillRef idx="1">
-            <a:schemeClr val="lt1"/>
-          </a:fillRef>
-          <a:effectRef idx="0">
-            <a:schemeClr val="dk1"/>
-          </a:effectRef>
-          <a:fontRef idx="minor">
-            <a:schemeClr val="dk1"/>
-          </a:fontRef>
-        </p:style>
-        <p:txBody>
-          <a:bodyPr rtlCol="0" anchor="ctr"/>
-          <a:lstStyle/>
-          <a:p>
-            <a:pPr algn="ctr"/>
-            <a:endParaRPr lang="zh-TW" altLang="en-US"/>
-          </a:p>
-        </p:txBody>
-      </p:sp>
-      <p:sp>
-        <p:nvSpPr>
-          <p:cNvPr id="11" name="向右箭號 10"/>
-          <p:cNvSpPr/>
-          <p:nvPr/>
-        </p:nvSpPr>
-        <p:spPr>
-          <a:xfrm rot="10800000" flipH="1">
-            <a:off x="5950140" y="1737109"/>
-            <a:ext cx="344862" cy="115570"/>
-          </a:xfrm>
-          <a:prstGeom prst="rightArrow">
-            <a:avLst/>
-          </a:prstGeom>
-          <a:ln>
-            <a:solidFill>
-              <a:srgbClr val="00B050"/>
-            </a:solidFill>
-          </a:ln>
-        </p:spPr>
-        <p:style>
-          <a:lnRef idx="2">
-            <a:schemeClr val="accent2"/>
-          </a:lnRef>
-          <a:fillRef idx="1">
-            <a:schemeClr val="lt1"/>
-          </a:fillRef>
-          <a:effectRef idx="0">
-            <a:schemeClr val="accent2"/>
-          </a:effectRef>
-          <a:fontRef idx="minor">
-            <a:schemeClr val="dk1"/>
-          </a:fontRef>
-        </p:style>
-        <p:txBody>
-          <a:bodyPr rot="0" spcFirstLastPara="0" vert="horz" wrap="square" lIns="91440" tIns="45720" rIns="91440" bIns="45720" numCol="1" spcCol="0" rtlCol="0" fromWordArt="0" anchor="ctr" anchorCtr="0" forceAA="0" compatLnSpc="1">
-            <a:prstTxWarp prst="textNoShape">
-              <a:avLst/>
-            </a:prstTxWarp>
-            <a:noAutofit/>
-          </a:bodyPr>
-          <a:lstStyle/>
-          <a:p>
-            <a:endParaRPr lang="zh-TW" altLang="en-US"/>
-          </a:p>
-        </p:txBody>
-      </p:sp>
       <p:pic>
         <p:nvPicPr>
-          <p:cNvPr id="12" name="Picture 2" descr="D:\Users\ZL.chen\Desktop\POC-ALG-W156_Luminance Color\black.jpg"/>
+          <p:cNvPr id="21" name="圖片 20"/>
           <p:cNvPicPr>
-            <a:picLocks noChangeAspect="1" noChangeArrowheads="1"/>
+            <a:picLocks noChangeAspect="1"/>
           </p:cNvPicPr>
           <p:nvPr/>
         </p:nvPicPr>
@@ -16706,29 +16501,149 @@
               </a:ext>
             </a:extLst>
           </a:blip>
-          <a:srcRect/>
           <a:stretch>
             <a:fillRect/>
           </a:stretch>
         </p:blipFill>
-        <p:spPr bwMode="auto">
+        <p:spPr>
           <a:xfrm>
-            <a:off x="910202" y="1632522"/>
-            <a:ext cx="4957044" cy="2788338"/>
+            <a:off x="6540411" y="1768691"/>
+            <a:ext cx="1515684" cy="1136764"/>
           </a:xfrm>
           <a:prstGeom prst="rect">
             <a:avLst/>
           </a:prstGeom>
-          <a:noFill/>
-          <a:extLst>
-            <a:ext uri="{909E8E84-426E-40DD-AFC4-6F175D3DCCD1}">
-              <a14:hiddenFill xmlns:a14="http://schemas.microsoft.com/office/drawing/2010/main">
-                <a:solidFill>
-                  <a:srgbClr val="FFFFFF"/>
-                </a:solidFill>
-              </a14:hiddenFill>
-            </a:ext>
-          </a:extLst>
+        </p:spPr>
+      </p:pic>
+      <p:pic>
+        <p:nvPicPr>
+          <p:cNvPr id="22" name="圖片 21"/>
+          <p:cNvPicPr>
+            <a:picLocks noChangeAspect="1"/>
+          </p:cNvPicPr>
+          <p:nvPr/>
+        </p:nvPicPr>
+        <p:blipFill>
+          <a:blip r:embed="rId5" cstate="print">
+            <a:extLst>
+              <a:ext uri="{28A0092B-C50C-407E-A947-70E740481C1C}">
+                <a14:useLocalDpi xmlns:a14="http://schemas.microsoft.com/office/drawing/2010/main" val="0"/>
+              </a:ext>
+            </a:extLst>
+          </a:blip>
+          <a:stretch>
+            <a:fillRect/>
+          </a:stretch>
+        </p:blipFill>
+        <p:spPr>
+          <a:xfrm>
+            <a:off x="6533782" y="2952111"/>
+            <a:ext cx="1522313" cy="1141734"/>
+          </a:xfrm>
+          <a:prstGeom prst="rect">
+            <a:avLst/>
+          </a:prstGeom>
+        </p:spPr>
+      </p:pic>
+      <p:pic>
+        <p:nvPicPr>
+          <p:cNvPr id="23" name="圖片 22"/>
+          <p:cNvPicPr>
+            <a:picLocks noChangeAspect="1"/>
+          </p:cNvPicPr>
+          <p:nvPr/>
+        </p:nvPicPr>
+        <p:blipFill>
+          <a:blip r:embed="rId6" cstate="print">
+            <a:extLst>
+              <a:ext uri="{28A0092B-C50C-407E-A947-70E740481C1C}">
+                <a14:useLocalDpi xmlns:a14="http://schemas.microsoft.com/office/drawing/2010/main" val="0"/>
+              </a:ext>
+            </a:extLst>
+          </a:blip>
+          <a:stretch>
+            <a:fillRect/>
+          </a:stretch>
+        </p:blipFill>
+        <p:spPr>
+          <a:xfrm>
+            <a:off x="4959495" y="2952111"/>
+            <a:ext cx="1515684" cy="1136764"/>
+          </a:xfrm>
+          <a:prstGeom prst="rect">
+            <a:avLst/>
+          </a:prstGeom>
+        </p:spPr>
+      </p:pic>
+      <p:cxnSp>
+        <p:nvCxnSpPr>
+          <p:cNvPr id="26" name="直線單箭頭接點 25"/>
+          <p:cNvCxnSpPr>
+            <a:stCxn id="14" idx="3"/>
+          </p:cNvCxnSpPr>
+          <p:nvPr/>
+        </p:nvCxnSpPr>
+        <p:spPr>
+          <a:xfrm flipV="1">
+            <a:off x="4082201" y="2932268"/>
+            <a:ext cx="877294" cy="3412"/>
+          </a:xfrm>
+          <a:prstGeom prst="straightConnector1">
+            <a:avLst/>
+          </a:prstGeom>
+          <a:ln w="19050" cap="flat" cmpd="sng" algn="ctr">
+            <a:solidFill>
+              <a:schemeClr val="accent1"/>
+            </a:solidFill>
+            <a:prstDash val="solid"/>
+            <a:round/>
+            <a:headEnd type="none" w="med" len="med"/>
+            <a:tailEnd type="arrow" w="med" len="med"/>
+          </a:ln>
+        </p:spPr>
+        <p:style>
+          <a:lnRef idx="0">
+            <a:scrgbClr r="0" g="0" b="0"/>
+          </a:lnRef>
+          <a:fillRef idx="0">
+            <a:scrgbClr r="0" g="0" b="0"/>
+          </a:fillRef>
+          <a:effectRef idx="0">
+            <a:scrgbClr r="0" g="0" b="0"/>
+          </a:effectRef>
+          <a:fontRef idx="minor">
+            <a:schemeClr val="tx1"/>
+          </a:fontRef>
+        </p:style>
+      </p:cxnSp>
+      <p:pic>
+        <p:nvPicPr>
+          <p:cNvPr id="19" name="圖片 18"/>
+          <p:cNvPicPr>
+            <a:picLocks noChangeAspect="1"/>
+          </p:cNvPicPr>
+          <p:nvPr/>
+        </p:nvPicPr>
+        <p:blipFill>
+          <a:blip r:embed="rId7" cstate="print">
+            <a:extLst>
+              <a:ext uri="{28A0092B-C50C-407E-A947-70E740481C1C}">
+                <a14:useLocalDpi xmlns:a14="http://schemas.microsoft.com/office/drawing/2010/main" val="0"/>
+              </a:ext>
+            </a:extLst>
+          </a:blip>
+          <a:stretch>
+            <a:fillRect/>
+          </a:stretch>
+        </p:blipFill>
+        <p:spPr>
+          <a:xfrm>
+            <a:off x="4959495" y="1768691"/>
+            <a:ext cx="1515684" cy="1136764"/>
+          </a:xfrm>
+          <a:prstGeom prst="rect">
+            <a:avLst/>
+          </a:prstGeom>
         </p:spPr>
       </p:pic>
     </p:spTree>
@@ -24182,7 +24097,7 @@
               <a:gd name="adj1" fmla="val 107467"/>
             </a:avLst>
           </a:prstGeom>
-          <a:ln>
+          <a:ln w="19050">
             <a:tailEnd type="arrow"/>
           </a:ln>
         </p:spPr>
@@ -24220,7 +24135,7 @@
               <a:gd name="adj1" fmla="val 106424"/>
             </a:avLst>
           </a:prstGeom>
-          <a:ln>
+          <a:ln w="19050">
             <a:tailEnd type="arrow"/>
           </a:ln>
         </p:spPr>
@@ -25459,7 +25374,7 @@
               <a:gd name="adj1" fmla="val 107467"/>
             </a:avLst>
           </a:prstGeom>
-          <a:ln>
+          <a:ln w="19050">
             <a:tailEnd type="arrow"/>
           </a:ln>
         </p:spPr>
@@ -25494,7 +25409,7 @@
               <a:gd name="adj1" fmla="val 106456"/>
             </a:avLst>
           </a:prstGeom>
-          <a:ln>
+          <a:ln w="19050">
             <a:tailEnd type="arrow"/>
           </a:ln>
         </p:spPr>
@@ -25549,6 +25464,126 @@
           </a:p>
         </p:txBody>
       </p:sp>
+      <p:pic>
+        <p:nvPicPr>
+          <p:cNvPr id="55" name="圖片 54"/>
+          <p:cNvPicPr>
+            <a:picLocks noChangeAspect="1"/>
+          </p:cNvPicPr>
+          <p:nvPr/>
+        </p:nvPicPr>
+        <p:blipFill>
+          <a:blip r:embed="rId7" cstate="print">
+            <a:extLst>
+              <a:ext uri="{28A0092B-C50C-407E-A947-70E740481C1C}">
+                <a14:useLocalDpi xmlns:a14="http://schemas.microsoft.com/office/drawing/2010/main" val="0"/>
+              </a:ext>
+            </a:extLst>
+          </a:blip>
+          <a:stretch>
+            <a:fillRect/>
+          </a:stretch>
+        </p:blipFill>
+        <p:spPr>
+          <a:xfrm>
+            <a:off x="2082554" y="1276290"/>
+            <a:ext cx="759873" cy="401551"/>
+          </a:xfrm>
+          <a:prstGeom prst="rect">
+            <a:avLst/>
+          </a:prstGeom>
+        </p:spPr>
+      </p:pic>
+      <p:pic>
+        <p:nvPicPr>
+          <p:cNvPr id="59" name="圖片 58"/>
+          <p:cNvPicPr>
+            <a:picLocks noChangeAspect="1"/>
+          </p:cNvPicPr>
+          <p:nvPr/>
+        </p:nvPicPr>
+        <p:blipFill>
+          <a:blip r:embed="rId7" cstate="print">
+            <a:extLst>
+              <a:ext uri="{28A0092B-C50C-407E-A947-70E740481C1C}">
+                <a14:useLocalDpi xmlns:a14="http://schemas.microsoft.com/office/drawing/2010/main" val="0"/>
+              </a:ext>
+            </a:extLst>
+          </a:blip>
+          <a:stretch>
+            <a:fillRect/>
+          </a:stretch>
+        </p:blipFill>
+        <p:spPr>
+          <a:xfrm>
+            <a:off x="5679166" y="1270744"/>
+            <a:ext cx="759873" cy="401551"/>
+          </a:xfrm>
+          <a:prstGeom prst="rect">
+            <a:avLst/>
+          </a:prstGeom>
+        </p:spPr>
+      </p:pic>
+      <p:pic>
+        <p:nvPicPr>
+          <p:cNvPr id="60" name="圖片 59"/>
+          <p:cNvPicPr>
+            <a:picLocks noChangeAspect="1"/>
+          </p:cNvPicPr>
+          <p:nvPr/>
+        </p:nvPicPr>
+        <p:blipFill>
+          <a:blip r:embed="rId7" cstate="print">
+            <a:extLst>
+              <a:ext uri="{28A0092B-C50C-407E-A947-70E740481C1C}">
+                <a14:useLocalDpi xmlns:a14="http://schemas.microsoft.com/office/drawing/2010/main" val="0"/>
+              </a:ext>
+            </a:extLst>
+          </a:blip>
+          <a:stretch>
+            <a:fillRect/>
+          </a:stretch>
+        </p:blipFill>
+        <p:spPr>
+          <a:xfrm>
+            <a:off x="2657004" y="3531109"/>
+            <a:ext cx="759873" cy="401551"/>
+          </a:xfrm>
+          <a:prstGeom prst="rect">
+            <a:avLst/>
+          </a:prstGeom>
+        </p:spPr>
+      </p:pic>
+      <p:pic>
+        <p:nvPicPr>
+          <p:cNvPr id="61" name="圖片 60"/>
+          <p:cNvPicPr>
+            <a:picLocks noChangeAspect="1"/>
+          </p:cNvPicPr>
+          <p:nvPr/>
+        </p:nvPicPr>
+        <p:blipFill>
+          <a:blip r:embed="rId7" cstate="print">
+            <a:extLst>
+              <a:ext uri="{28A0092B-C50C-407E-A947-70E740481C1C}">
+                <a14:useLocalDpi xmlns:a14="http://schemas.microsoft.com/office/drawing/2010/main" val="0"/>
+              </a:ext>
+            </a:extLst>
+          </a:blip>
+          <a:stretch>
+            <a:fillRect/>
+          </a:stretch>
+        </p:blipFill>
+        <p:spPr>
+          <a:xfrm>
+            <a:off x="6305784" y="3536553"/>
+            <a:ext cx="759873" cy="401551"/>
+          </a:xfrm>
+          <a:prstGeom prst="rect">
+            <a:avLst/>
+          </a:prstGeom>
+        </p:spPr>
+      </p:pic>
     </p:spTree>
     <p:extLst>
       <p:ext uri="{BB962C8B-B14F-4D97-AF65-F5344CB8AC3E}">

</xml_diff>